<commit_message>
addet bar chart data
</commit_message>
<xml_diff>
--- a/Resources/Presentation.pptx
+++ b/Resources/Presentation.pptx
@@ -114,6 +114,11 @@
       </a:defRPr>
     </a:lvl9pPr>
   </p:defaultTextStyle>
+  <p:extLst>
+    <p:ext uri="{EFAFB233-063F-42B5-8137-9DF3F51BA10A}">
+      <p15:sldGuideLst xmlns:p15="http://schemas.microsoft.com/office/powerpoint/2012/main"/>
+    </p:ext>
+  </p:extLst>
 </p:presentation>
 </file>
 
@@ -123,6 +128,2994 @@
     <p1510:client id="{0B5EA65F-1DAE-6343-A45E-04D3A605A938}" v="26" dt="2021-11-23T17:27:10.348"/>
   </p1510:revLst>
 </p1510:revInfo>
+</file>
+
+<file path=ppt/diagrams/colors1.xml><?xml version="1.0" encoding="utf-8"?>
+<dgm:colorsDef xmlns:dgm="http://schemas.openxmlformats.org/drawingml/2006/diagram" xmlns:a="http://schemas.openxmlformats.org/drawingml/2006/main" uniqueId="urn:microsoft.com/office/officeart/2005/8/colors/accent1_2">
+  <dgm:title val=""/>
+  <dgm:desc val=""/>
+  <dgm:catLst>
+    <dgm:cat type="accent1" pri="11200"/>
+  </dgm:catLst>
+  <dgm:styleLbl name="node0">
+    <dgm:fillClrLst meth="repeat">
+      <a:schemeClr val="accent1"/>
+    </dgm:fillClrLst>
+    <dgm:linClrLst meth="repeat">
+      <a:schemeClr val="lt1"/>
+    </dgm:linClrLst>
+    <dgm:effectClrLst/>
+    <dgm:txLinClrLst/>
+    <dgm:txFillClrLst/>
+    <dgm:txEffectClrLst/>
+  </dgm:styleLbl>
+  <dgm:styleLbl name="alignNode1">
+    <dgm:fillClrLst meth="repeat">
+      <a:schemeClr val="accent1"/>
+    </dgm:fillClrLst>
+    <dgm:linClrLst meth="repeat">
+      <a:schemeClr val="accent1"/>
+    </dgm:linClrLst>
+    <dgm:effectClrLst/>
+    <dgm:txLinClrLst/>
+    <dgm:txFillClrLst/>
+    <dgm:txEffectClrLst/>
+  </dgm:styleLbl>
+  <dgm:styleLbl name="node1">
+    <dgm:fillClrLst meth="repeat">
+      <a:schemeClr val="accent1"/>
+    </dgm:fillClrLst>
+    <dgm:linClrLst meth="repeat">
+      <a:schemeClr val="lt1"/>
+    </dgm:linClrLst>
+    <dgm:effectClrLst/>
+    <dgm:txLinClrLst/>
+    <dgm:txFillClrLst/>
+    <dgm:txEffectClrLst/>
+  </dgm:styleLbl>
+  <dgm:styleLbl name="lnNode1">
+    <dgm:fillClrLst meth="repeat">
+      <a:schemeClr val="accent1"/>
+    </dgm:fillClrLst>
+    <dgm:linClrLst meth="repeat">
+      <a:schemeClr val="lt1"/>
+    </dgm:linClrLst>
+    <dgm:effectClrLst/>
+    <dgm:txLinClrLst/>
+    <dgm:txFillClrLst/>
+    <dgm:txEffectClrLst/>
+  </dgm:styleLbl>
+  <dgm:styleLbl name="vennNode1">
+    <dgm:fillClrLst meth="repeat">
+      <a:schemeClr val="accent1">
+        <a:alpha val="50000"/>
+      </a:schemeClr>
+    </dgm:fillClrLst>
+    <dgm:linClrLst meth="repeat">
+      <a:schemeClr val="lt1"/>
+    </dgm:linClrLst>
+    <dgm:effectClrLst/>
+    <dgm:txLinClrLst/>
+    <dgm:txFillClrLst/>
+    <dgm:txEffectClrLst/>
+  </dgm:styleLbl>
+  <dgm:styleLbl name="node2">
+    <dgm:fillClrLst meth="repeat">
+      <a:schemeClr val="accent1"/>
+    </dgm:fillClrLst>
+    <dgm:linClrLst meth="repeat">
+      <a:schemeClr val="lt1"/>
+    </dgm:linClrLst>
+    <dgm:effectClrLst/>
+    <dgm:txLinClrLst/>
+    <dgm:txFillClrLst/>
+    <dgm:txEffectClrLst/>
+  </dgm:styleLbl>
+  <dgm:styleLbl name="node3">
+    <dgm:fillClrLst meth="repeat">
+      <a:schemeClr val="accent1"/>
+    </dgm:fillClrLst>
+    <dgm:linClrLst meth="repeat">
+      <a:schemeClr val="lt1"/>
+    </dgm:linClrLst>
+    <dgm:effectClrLst/>
+    <dgm:txLinClrLst/>
+    <dgm:txFillClrLst/>
+    <dgm:txEffectClrLst/>
+  </dgm:styleLbl>
+  <dgm:styleLbl name="node4">
+    <dgm:fillClrLst meth="repeat">
+      <a:schemeClr val="accent1"/>
+    </dgm:fillClrLst>
+    <dgm:linClrLst meth="repeat">
+      <a:schemeClr val="lt1"/>
+    </dgm:linClrLst>
+    <dgm:effectClrLst/>
+    <dgm:txLinClrLst/>
+    <dgm:txFillClrLst/>
+    <dgm:txEffectClrLst/>
+  </dgm:styleLbl>
+  <dgm:styleLbl name="fgImgPlace1">
+    <dgm:fillClrLst meth="repeat">
+      <a:schemeClr val="accent1">
+        <a:tint val="50000"/>
+      </a:schemeClr>
+    </dgm:fillClrLst>
+    <dgm:linClrLst meth="repeat">
+      <a:schemeClr val="lt1"/>
+    </dgm:linClrLst>
+    <dgm:effectClrLst/>
+    <dgm:txLinClrLst/>
+    <dgm:txFillClrLst meth="repeat">
+      <a:schemeClr val="lt1"/>
+    </dgm:txFillClrLst>
+    <dgm:txEffectClrLst/>
+  </dgm:styleLbl>
+  <dgm:styleLbl name="alignImgPlace1">
+    <dgm:fillClrLst meth="repeat">
+      <a:schemeClr val="accent1">
+        <a:tint val="50000"/>
+      </a:schemeClr>
+    </dgm:fillClrLst>
+    <dgm:linClrLst meth="repeat">
+      <a:schemeClr val="lt1"/>
+    </dgm:linClrLst>
+    <dgm:effectClrLst/>
+    <dgm:txLinClrLst/>
+    <dgm:txFillClrLst meth="repeat">
+      <a:schemeClr val="lt1"/>
+    </dgm:txFillClrLst>
+    <dgm:txEffectClrLst/>
+  </dgm:styleLbl>
+  <dgm:styleLbl name="bgImgPlace1">
+    <dgm:fillClrLst meth="repeat">
+      <a:schemeClr val="accent1">
+        <a:tint val="50000"/>
+      </a:schemeClr>
+    </dgm:fillClrLst>
+    <dgm:linClrLst meth="repeat">
+      <a:schemeClr val="lt1"/>
+    </dgm:linClrLst>
+    <dgm:effectClrLst/>
+    <dgm:txLinClrLst/>
+    <dgm:txFillClrLst meth="repeat">
+      <a:schemeClr val="lt1"/>
+    </dgm:txFillClrLst>
+    <dgm:txEffectClrLst/>
+  </dgm:styleLbl>
+  <dgm:styleLbl name="sibTrans2D1">
+    <dgm:fillClrLst meth="repeat">
+      <a:schemeClr val="accent1">
+        <a:tint val="60000"/>
+      </a:schemeClr>
+    </dgm:fillClrLst>
+    <dgm:linClrLst meth="repeat">
+      <a:schemeClr val="accent1">
+        <a:tint val="60000"/>
+      </a:schemeClr>
+    </dgm:linClrLst>
+    <dgm:effectClrLst/>
+    <dgm:txLinClrLst/>
+    <dgm:txFillClrLst/>
+    <dgm:txEffectClrLst/>
+  </dgm:styleLbl>
+  <dgm:styleLbl name="fgSibTrans2D1">
+    <dgm:fillClrLst meth="repeat">
+      <a:schemeClr val="accent1">
+        <a:tint val="60000"/>
+      </a:schemeClr>
+    </dgm:fillClrLst>
+    <dgm:linClrLst meth="repeat">
+      <a:schemeClr val="accent1">
+        <a:tint val="60000"/>
+      </a:schemeClr>
+    </dgm:linClrLst>
+    <dgm:effectClrLst/>
+    <dgm:txLinClrLst/>
+    <dgm:txFillClrLst/>
+    <dgm:txEffectClrLst/>
+  </dgm:styleLbl>
+  <dgm:styleLbl name="bgSibTrans2D1">
+    <dgm:fillClrLst meth="repeat">
+      <a:schemeClr val="accent1">
+        <a:tint val="60000"/>
+      </a:schemeClr>
+    </dgm:fillClrLst>
+    <dgm:linClrLst meth="repeat">
+      <a:schemeClr val="accent1">
+        <a:tint val="60000"/>
+      </a:schemeClr>
+    </dgm:linClrLst>
+    <dgm:effectClrLst/>
+    <dgm:txLinClrLst/>
+    <dgm:txFillClrLst/>
+    <dgm:txEffectClrLst/>
+  </dgm:styleLbl>
+  <dgm:styleLbl name="sibTrans1D1">
+    <dgm:fillClrLst meth="repeat">
+      <a:schemeClr val="accent1"/>
+    </dgm:fillClrLst>
+    <dgm:linClrLst meth="repeat">
+      <a:schemeClr val="accent1"/>
+    </dgm:linClrLst>
+    <dgm:effectClrLst/>
+    <dgm:txLinClrLst/>
+    <dgm:txFillClrLst meth="repeat">
+      <a:schemeClr val="tx1"/>
+    </dgm:txFillClrLst>
+    <dgm:txEffectClrLst/>
+  </dgm:styleLbl>
+  <dgm:styleLbl name="callout">
+    <dgm:fillClrLst meth="repeat">
+      <a:schemeClr val="accent1"/>
+    </dgm:fillClrLst>
+    <dgm:linClrLst meth="repeat">
+      <a:schemeClr val="accent1">
+        <a:tint val="50000"/>
+      </a:schemeClr>
+    </dgm:linClrLst>
+    <dgm:effectClrLst/>
+    <dgm:txLinClrLst/>
+    <dgm:txFillClrLst meth="repeat">
+      <a:schemeClr val="tx1"/>
+    </dgm:txFillClrLst>
+    <dgm:txEffectClrLst/>
+  </dgm:styleLbl>
+  <dgm:styleLbl name="asst0">
+    <dgm:fillClrLst meth="repeat">
+      <a:schemeClr val="accent1"/>
+    </dgm:fillClrLst>
+    <dgm:linClrLst meth="repeat">
+      <a:schemeClr val="lt1"/>
+    </dgm:linClrLst>
+    <dgm:effectClrLst/>
+    <dgm:txLinClrLst/>
+    <dgm:txFillClrLst/>
+    <dgm:txEffectClrLst/>
+  </dgm:styleLbl>
+  <dgm:styleLbl name="asst1">
+    <dgm:fillClrLst meth="repeat">
+      <a:schemeClr val="accent1"/>
+    </dgm:fillClrLst>
+    <dgm:linClrLst meth="repeat">
+      <a:schemeClr val="lt1"/>
+    </dgm:linClrLst>
+    <dgm:effectClrLst/>
+    <dgm:txLinClrLst/>
+    <dgm:txFillClrLst/>
+    <dgm:txEffectClrLst/>
+  </dgm:styleLbl>
+  <dgm:styleLbl name="asst2">
+    <dgm:fillClrLst meth="repeat">
+      <a:schemeClr val="accent1"/>
+    </dgm:fillClrLst>
+    <dgm:linClrLst meth="repeat">
+      <a:schemeClr val="lt1"/>
+    </dgm:linClrLst>
+    <dgm:effectClrLst/>
+    <dgm:txLinClrLst/>
+    <dgm:txFillClrLst/>
+    <dgm:txEffectClrLst/>
+  </dgm:styleLbl>
+  <dgm:styleLbl name="asst3">
+    <dgm:fillClrLst meth="repeat">
+      <a:schemeClr val="accent1"/>
+    </dgm:fillClrLst>
+    <dgm:linClrLst meth="repeat">
+      <a:schemeClr val="lt1"/>
+    </dgm:linClrLst>
+    <dgm:effectClrLst/>
+    <dgm:txLinClrLst/>
+    <dgm:txFillClrLst/>
+    <dgm:txEffectClrLst/>
+  </dgm:styleLbl>
+  <dgm:styleLbl name="asst4">
+    <dgm:fillClrLst meth="repeat">
+      <a:schemeClr val="accent1"/>
+    </dgm:fillClrLst>
+    <dgm:linClrLst meth="repeat">
+      <a:schemeClr val="lt1"/>
+    </dgm:linClrLst>
+    <dgm:effectClrLst/>
+    <dgm:txLinClrLst/>
+    <dgm:txFillClrLst/>
+    <dgm:txEffectClrLst/>
+  </dgm:styleLbl>
+  <dgm:styleLbl name="parChTrans2D1">
+    <dgm:fillClrLst meth="repeat">
+      <a:schemeClr val="accent1">
+        <a:tint val="60000"/>
+      </a:schemeClr>
+    </dgm:fillClrLst>
+    <dgm:linClrLst meth="repeat">
+      <a:schemeClr val="accent1">
+        <a:tint val="60000"/>
+      </a:schemeClr>
+    </dgm:linClrLst>
+    <dgm:effectClrLst/>
+    <dgm:txLinClrLst/>
+    <dgm:txFillClrLst meth="repeat">
+      <a:schemeClr val="lt1"/>
+    </dgm:txFillClrLst>
+    <dgm:txEffectClrLst/>
+  </dgm:styleLbl>
+  <dgm:styleLbl name="parChTrans2D2">
+    <dgm:fillClrLst meth="repeat">
+      <a:schemeClr val="accent1"/>
+    </dgm:fillClrLst>
+    <dgm:linClrLst meth="repeat">
+      <a:schemeClr val="accent1"/>
+    </dgm:linClrLst>
+    <dgm:effectClrLst/>
+    <dgm:txLinClrLst/>
+    <dgm:txFillClrLst meth="repeat">
+      <a:schemeClr val="lt1"/>
+    </dgm:txFillClrLst>
+    <dgm:txEffectClrLst/>
+  </dgm:styleLbl>
+  <dgm:styleLbl name="parChTrans2D3">
+    <dgm:fillClrLst meth="repeat">
+      <a:schemeClr val="accent1"/>
+    </dgm:fillClrLst>
+    <dgm:linClrLst meth="repeat">
+      <a:schemeClr val="accent1"/>
+    </dgm:linClrLst>
+    <dgm:effectClrLst/>
+    <dgm:txLinClrLst/>
+    <dgm:txFillClrLst meth="repeat">
+      <a:schemeClr val="lt1"/>
+    </dgm:txFillClrLst>
+    <dgm:txEffectClrLst/>
+  </dgm:styleLbl>
+  <dgm:styleLbl name="parChTrans2D4">
+    <dgm:fillClrLst meth="repeat">
+      <a:schemeClr val="accent1"/>
+    </dgm:fillClrLst>
+    <dgm:linClrLst meth="repeat">
+      <a:schemeClr val="accent1"/>
+    </dgm:linClrLst>
+    <dgm:effectClrLst/>
+    <dgm:txLinClrLst/>
+    <dgm:txFillClrLst meth="repeat">
+      <a:schemeClr val="lt1"/>
+    </dgm:txFillClrLst>
+    <dgm:txEffectClrLst/>
+  </dgm:styleLbl>
+  <dgm:styleLbl name="parChTrans1D1">
+    <dgm:fillClrLst meth="repeat">
+      <a:schemeClr val="accent1"/>
+    </dgm:fillClrLst>
+    <dgm:linClrLst meth="repeat">
+      <a:schemeClr val="accent1">
+        <a:shade val="60000"/>
+      </a:schemeClr>
+    </dgm:linClrLst>
+    <dgm:effectClrLst/>
+    <dgm:txLinClrLst/>
+    <dgm:txFillClrLst meth="repeat">
+      <a:schemeClr val="tx1"/>
+    </dgm:txFillClrLst>
+    <dgm:txEffectClrLst/>
+  </dgm:styleLbl>
+  <dgm:styleLbl name="parChTrans1D2">
+    <dgm:fillClrLst meth="repeat">
+      <a:schemeClr val="accent1"/>
+    </dgm:fillClrLst>
+    <dgm:linClrLst meth="repeat">
+      <a:schemeClr val="accent1">
+        <a:shade val="60000"/>
+      </a:schemeClr>
+    </dgm:linClrLst>
+    <dgm:effectClrLst/>
+    <dgm:txLinClrLst/>
+    <dgm:txFillClrLst meth="repeat">
+      <a:schemeClr val="tx1"/>
+    </dgm:txFillClrLst>
+    <dgm:txEffectClrLst/>
+  </dgm:styleLbl>
+  <dgm:styleLbl name="parChTrans1D3">
+    <dgm:fillClrLst meth="repeat">
+      <a:schemeClr val="accent1"/>
+    </dgm:fillClrLst>
+    <dgm:linClrLst meth="repeat">
+      <a:schemeClr val="accent1">
+        <a:shade val="80000"/>
+      </a:schemeClr>
+    </dgm:linClrLst>
+    <dgm:effectClrLst/>
+    <dgm:txLinClrLst/>
+    <dgm:txFillClrLst meth="repeat">
+      <a:schemeClr val="tx1"/>
+    </dgm:txFillClrLst>
+    <dgm:txEffectClrLst/>
+  </dgm:styleLbl>
+  <dgm:styleLbl name="parChTrans1D4">
+    <dgm:fillClrLst meth="repeat">
+      <a:schemeClr val="accent1"/>
+    </dgm:fillClrLst>
+    <dgm:linClrLst meth="repeat">
+      <a:schemeClr val="accent1">
+        <a:shade val="80000"/>
+      </a:schemeClr>
+    </dgm:linClrLst>
+    <dgm:effectClrLst/>
+    <dgm:txLinClrLst/>
+    <dgm:txFillClrLst meth="repeat">
+      <a:schemeClr val="tx1"/>
+    </dgm:txFillClrLst>
+    <dgm:txEffectClrLst/>
+  </dgm:styleLbl>
+  <dgm:styleLbl name="fgAcc1">
+    <dgm:fillClrLst meth="repeat">
+      <a:schemeClr val="lt1">
+        <a:alpha val="90000"/>
+      </a:schemeClr>
+    </dgm:fillClrLst>
+    <dgm:linClrLst meth="repeat">
+      <a:schemeClr val="accent1"/>
+    </dgm:linClrLst>
+    <dgm:effectClrLst/>
+    <dgm:txLinClrLst/>
+    <dgm:txFillClrLst meth="repeat">
+      <a:schemeClr val="dk1"/>
+    </dgm:txFillClrLst>
+    <dgm:txEffectClrLst/>
+  </dgm:styleLbl>
+  <dgm:styleLbl name="conFgAcc1">
+    <dgm:fillClrLst meth="repeat">
+      <a:schemeClr val="lt1">
+        <a:alpha val="90000"/>
+      </a:schemeClr>
+    </dgm:fillClrLst>
+    <dgm:linClrLst meth="repeat">
+      <a:schemeClr val="accent1"/>
+    </dgm:linClrLst>
+    <dgm:effectClrLst/>
+    <dgm:txLinClrLst/>
+    <dgm:txFillClrLst meth="repeat">
+      <a:schemeClr val="dk1"/>
+    </dgm:txFillClrLst>
+    <dgm:txEffectClrLst/>
+  </dgm:styleLbl>
+  <dgm:styleLbl name="alignAcc1">
+    <dgm:fillClrLst meth="repeat">
+      <a:schemeClr val="lt1">
+        <a:alpha val="90000"/>
+      </a:schemeClr>
+    </dgm:fillClrLst>
+    <dgm:linClrLst meth="repeat">
+      <a:schemeClr val="accent1"/>
+    </dgm:linClrLst>
+    <dgm:effectClrLst/>
+    <dgm:txLinClrLst/>
+    <dgm:txFillClrLst meth="repeat">
+      <a:schemeClr val="dk1"/>
+    </dgm:txFillClrLst>
+    <dgm:txEffectClrLst/>
+  </dgm:styleLbl>
+  <dgm:styleLbl name="trAlignAcc1">
+    <dgm:fillClrLst meth="repeat">
+      <a:schemeClr val="lt1">
+        <a:alpha val="40000"/>
+      </a:schemeClr>
+    </dgm:fillClrLst>
+    <dgm:linClrLst meth="repeat">
+      <a:schemeClr val="accent1"/>
+    </dgm:linClrLst>
+    <dgm:effectClrLst/>
+    <dgm:txLinClrLst/>
+    <dgm:txFillClrLst meth="repeat">
+      <a:schemeClr val="dk1"/>
+    </dgm:txFillClrLst>
+    <dgm:txEffectClrLst/>
+  </dgm:styleLbl>
+  <dgm:styleLbl name="bgAcc1">
+    <dgm:fillClrLst meth="repeat">
+      <a:schemeClr val="lt1">
+        <a:alpha val="90000"/>
+      </a:schemeClr>
+    </dgm:fillClrLst>
+    <dgm:linClrLst meth="repeat">
+      <a:schemeClr val="accent1"/>
+    </dgm:linClrLst>
+    <dgm:effectClrLst/>
+    <dgm:txLinClrLst/>
+    <dgm:txFillClrLst meth="repeat">
+      <a:schemeClr val="dk1"/>
+    </dgm:txFillClrLst>
+    <dgm:txEffectClrLst/>
+  </dgm:styleLbl>
+  <dgm:styleLbl name="solidFgAcc1">
+    <dgm:fillClrLst meth="repeat">
+      <a:schemeClr val="lt1"/>
+    </dgm:fillClrLst>
+    <dgm:linClrLst meth="repeat">
+      <a:schemeClr val="accent1"/>
+    </dgm:linClrLst>
+    <dgm:effectClrLst/>
+    <dgm:txLinClrLst/>
+    <dgm:txFillClrLst meth="repeat">
+      <a:schemeClr val="dk1"/>
+    </dgm:txFillClrLst>
+    <dgm:txEffectClrLst/>
+  </dgm:styleLbl>
+  <dgm:styleLbl name="solidAlignAcc1">
+    <dgm:fillClrLst meth="repeat">
+      <a:schemeClr val="lt1"/>
+    </dgm:fillClrLst>
+    <dgm:linClrLst meth="repeat">
+      <a:schemeClr val="accent1"/>
+    </dgm:linClrLst>
+    <dgm:effectClrLst/>
+    <dgm:txLinClrLst/>
+    <dgm:txFillClrLst meth="repeat">
+      <a:schemeClr val="dk1"/>
+    </dgm:txFillClrLst>
+    <dgm:txEffectClrLst/>
+  </dgm:styleLbl>
+  <dgm:styleLbl name="solidBgAcc1">
+    <dgm:fillClrLst meth="repeat">
+      <a:schemeClr val="lt1"/>
+    </dgm:fillClrLst>
+    <dgm:linClrLst meth="repeat">
+      <a:schemeClr val="accent1"/>
+    </dgm:linClrLst>
+    <dgm:effectClrLst/>
+    <dgm:txLinClrLst/>
+    <dgm:txFillClrLst meth="repeat">
+      <a:schemeClr val="dk1"/>
+    </dgm:txFillClrLst>
+    <dgm:txEffectClrLst/>
+  </dgm:styleLbl>
+  <dgm:styleLbl name="fgAccFollowNode1">
+    <dgm:fillClrLst meth="repeat">
+      <a:schemeClr val="accent1">
+        <a:alpha val="90000"/>
+        <a:tint val="40000"/>
+      </a:schemeClr>
+    </dgm:fillClrLst>
+    <dgm:linClrLst meth="repeat">
+      <a:schemeClr val="accent1">
+        <a:alpha val="90000"/>
+        <a:tint val="40000"/>
+      </a:schemeClr>
+    </dgm:linClrLst>
+    <dgm:effectClrLst/>
+    <dgm:txLinClrLst/>
+    <dgm:txFillClrLst meth="repeat">
+      <a:schemeClr val="dk1"/>
+    </dgm:txFillClrLst>
+    <dgm:txEffectClrLst/>
+  </dgm:styleLbl>
+  <dgm:styleLbl name="alignAccFollowNode1">
+    <dgm:fillClrLst meth="repeat">
+      <a:schemeClr val="accent1">
+        <a:alpha val="90000"/>
+        <a:tint val="40000"/>
+      </a:schemeClr>
+    </dgm:fillClrLst>
+    <dgm:linClrLst meth="repeat">
+      <a:schemeClr val="accent1">
+        <a:alpha val="90000"/>
+        <a:tint val="40000"/>
+      </a:schemeClr>
+    </dgm:linClrLst>
+    <dgm:effectClrLst/>
+    <dgm:txLinClrLst/>
+    <dgm:txFillClrLst meth="repeat">
+      <a:schemeClr val="dk1"/>
+    </dgm:txFillClrLst>
+    <dgm:txEffectClrLst/>
+  </dgm:styleLbl>
+  <dgm:styleLbl name="bgAccFollowNode1">
+    <dgm:fillClrLst meth="repeat">
+      <a:schemeClr val="accent1">
+        <a:alpha val="90000"/>
+        <a:tint val="40000"/>
+      </a:schemeClr>
+    </dgm:fillClrLst>
+    <dgm:linClrLst meth="repeat">
+      <a:schemeClr val="accent1">
+        <a:alpha val="90000"/>
+        <a:tint val="40000"/>
+      </a:schemeClr>
+    </dgm:linClrLst>
+    <dgm:effectClrLst/>
+    <dgm:txLinClrLst/>
+    <dgm:txFillClrLst meth="repeat">
+      <a:schemeClr val="dk1"/>
+    </dgm:txFillClrLst>
+    <dgm:txEffectClrLst/>
+  </dgm:styleLbl>
+  <dgm:styleLbl name="fgAcc0">
+    <dgm:fillClrLst meth="repeat">
+      <a:schemeClr val="lt1">
+        <a:alpha val="90000"/>
+      </a:schemeClr>
+    </dgm:fillClrLst>
+    <dgm:linClrLst meth="repeat">
+      <a:schemeClr val="accent1"/>
+    </dgm:linClrLst>
+    <dgm:effectClrLst/>
+    <dgm:txLinClrLst/>
+    <dgm:txFillClrLst meth="repeat">
+      <a:schemeClr val="dk1"/>
+    </dgm:txFillClrLst>
+    <dgm:txEffectClrLst/>
+  </dgm:styleLbl>
+  <dgm:styleLbl name="fgAcc2">
+    <dgm:fillClrLst meth="repeat">
+      <a:schemeClr val="lt1">
+        <a:alpha val="90000"/>
+      </a:schemeClr>
+    </dgm:fillClrLst>
+    <dgm:linClrLst meth="repeat">
+      <a:schemeClr val="accent1"/>
+    </dgm:linClrLst>
+    <dgm:effectClrLst/>
+    <dgm:txLinClrLst/>
+    <dgm:txFillClrLst meth="repeat">
+      <a:schemeClr val="dk1"/>
+    </dgm:txFillClrLst>
+    <dgm:txEffectClrLst/>
+  </dgm:styleLbl>
+  <dgm:styleLbl name="fgAcc3">
+    <dgm:fillClrLst meth="repeat">
+      <a:schemeClr val="lt1">
+        <a:alpha val="90000"/>
+      </a:schemeClr>
+    </dgm:fillClrLst>
+    <dgm:linClrLst meth="repeat">
+      <a:schemeClr val="accent1"/>
+    </dgm:linClrLst>
+    <dgm:effectClrLst/>
+    <dgm:txLinClrLst/>
+    <dgm:txFillClrLst meth="repeat">
+      <a:schemeClr val="dk1"/>
+    </dgm:txFillClrLst>
+    <dgm:txEffectClrLst/>
+  </dgm:styleLbl>
+  <dgm:styleLbl name="fgAcc4">
+    <dgm:fillClrLst meth="repeat">
+      <a:schemeClr val="lt1">
+        <a:alpha val="90000"/>
+      </a:schemeClr>
+    </dgm:fillClrLst>
+    <dgm:linClrLst meth="repeat">
+      <a:schemeClr val="accent1"/>
+    </dgm:linClrLst>
+    <dgm:effectClrLst/>
+    <dgm:txLinClrLst/>
+    <dgm:txFillClrLst meth="repeat">
+      <a:schemeClr val="dk1"/>
+    </dgm:txFillClrLst>
+    <dgm:txEffectClrLst/>
+  </dgm:styleLbl>
+  <dgm:styleLbl name="bgShp">
+    <dgm:fillClrLst meth="repeat">
+      <a:schemeClr val="accent1">
+        <a:tint val="40000"/>
+      </a:schemeClr>
+    </dgm:fillClrLst>
+    <dgm:linClrLst meth="repeat">
+      <a:schemeClr val="accent1"/>
+    </dgm:linClrLst>
+    <dgm:effectClrLst/>
+    <dgm:txLinClrLst/>
+    <dgm:txFillClrLst meth="repeat">
+      <a:schemeClr val="dk1"/>
+    </dgm:txFillClrLst>
+    <dgm:txEffectClrLst/>
+  </dgm:styleLbl>
+  <dgm:styleLbl name="dkBgShp">
+    <dgm:fillClrLst meth="repeat">
+      <a:schemeClr val="accent1">
+        <a:shade val="80000"/>
+      </a:schemeClr>
+    </dgm:fillClrLst>
+    <dgm:linClrLst meth="repeat">
+      <a:schemeClr val="accent1"/>
+    </dgm:linClrLst>
+    <dgm:effectClrLst/>
+    <dgm:txLinClrLst/>
+    <dgm:txFillClrLst meth="repeat">
+      <a:schemeClr val="lt1"/>
+    </dgm:txFillClrLst>
+    <dgm:txEffectClrLst/>
+  </dgm:styleLbl>
+  <dgm:styleLbl name="trBgShp">
+    <dgm:fillClrLst meth="repeat">
+      <a:schemeClr val="accent1">
+        <a:tint val="50000"/>
+        <a:alpha val="40000"/>
+      </a:schemeClr>
+    </dgm:fillClrLst>
+    <dgm:linClrLst meth="repeat">
+      <a:schemeClr val="accent1"/>
+    </dgm:linClrLst>
+    <dgm:effectClrLst/>
+    <dgm:txLinClrLst/>
+    <dgm:txFillClrLst meth="repeat">
+      <a:schemeClr val="lt1"/>
+    </dgm:txFillClrLst>
+    <dgm:txEffectClrLst/>
+  </dgm:styleLbl>
+  <dgm:styleLbl name="fgShp">
+    <dgm:fillClrLst meth="repeat">
+      <a:schemeClr val="accent1">
+        <a:tint val="60000"/>
+      </a:schemeClr>
+    </dgm:fillClrLst>
+    <dgm:linClrLst meth="repeat">
+      <a:schemeClr val="lt1"/>
+    </dgm:linClrLst>
+    <dgm:effectClrLst/>
+    <dgm:txLinClrLst/>
+    <dgm:txFillClrLst meth="repeat">
+      <a:schemeClr val="dk1"/>
+    </dgm:txFillClrLst>
+    <dgm:txEffectClrLst/>
+  </dgm:styleLbl>
+  <dgm:styleLbl name="revTx">
+    <dgm:fillClrLst meth="repeat">
+      <a:schemeClr val="lt1">
+        <a:alpha val="0"/>
+      </a:schemeClr>
+    </dgm:fillClrLst>
+    <dgm:linClrLst meth="repeat">
+      <a:schemeClr val="dk1">
+        <a:alpha val="0"/>
+      </a:schemeClr>
+    </dgm:linClrLst>
+    <dgm:effectClrLst/>
+    <dgm:txLinClrLst/>
+    <dgm:txFillClrLst meth="repeat">
+      <a:schemeClr val="tx1"/>
+    </dgm:txFillClrLst>
+    <dgm:txEffectClrLst/>
+  </dgm:styleLbl>
+</dgm:colorsDef>
+</file>
+
+<file path=ppt/diagrams/data1.xml><?xml version="1.0" encoding="utf-8"?>
+<dgm:dataModel xmlns:dgm="http://schemas.openxmlformats.org/drawingml/2006/diagram" xmlns:a="http://schemas.openxmlformats.org/drawingml/2006/main">
+  <dgm:ptLst>
+    <dgm:pt modelId="{D04CFBC0-9D5E-4287-8547-183AB4A3B617}" type="doc">
+      <dgm:prSet loTypeId="urn:microsoft.com/office/officeart/2005/8/layout/chevron2" loCatId="process" qsTypeId="urn:microsoft.com/office/officeart/2005/8/quickstyle/simple1" qsCatId="simple" csTypeId="urn:microsoft.com/office/officeart/2005/8/colors/accent1_2" csCatId="accent1" phldr="1"/>
+      <dgm:spPr/>
+      <dgm:t>
+        <a:bodyPr/>
+        <a:lstStyle/>
+        <a:p>
+          <a:endParaRPr lang="en-US"/>
+        </a:p>
+      </dgm:t>
+    </dgm:pt>
+    <dgm:pt modelId="{B307596A-F680-4045-BF7F-F9CB52F3B002}">
+      <dgm:prSet phldrT="[Text]" custT="1"/>
+      <dgm:spPr/>
+      <dgm:t>
+        <a:bodyPr/>
+        <a:lstStyle/>
+        <a:p>
+          <a:r>
+            <a:rPr lang="en-US" sz="2000" dirty="0"/>
+            <a:t>Linear</a:t>
+          </a:r>
+        </a:p>
+      </dgm:t>
+    </dgm:pt>
+    <dgm:pt modelId="{B8A79D03-3646-40BF-8578-6ACBFB698D74}" type="parTrans" cxnId="{D1AD703D-F2FB-49E7-8D16-4ADA575B7984}">
+      <dgm:prSet/>
+      <dgm:spPr/>
+      <dgm:t>
+        <a:bodyPr/>
+        <a:lstStyle/>
+        <a:p>
+          <a:endParaRPr lang="en-US"/>
+        </a:p>
+      </dgm:t>
+    </dgm:pt>
+    <dgm:pt modelId="{AD392D25-5E88-4FBE-AB26-2E76AC3DF6D5}" type="sibTrans" cxnId="{D1AD703D-F2FB-49E7-8D16-4ADA575B7984}">
+      <dgm:prSet/>
+      <dgm:spPr/>
+      <dgm:t>
+        <a:bodyPr/>
+        <a:lstStyle/>
+        <a:p>
+          <a:endParaRPr lang="en-US"/>
+        </a:p>
+      </dgm:t>
+    </dgm:pt>
+    <dgm:pt modelId="{16E3F1D2-F25C-4239-911D-27F65F3335D6}">
+      <dgm:prSet phldrT="[Text]" phldr="1" custT="1"/>
+      <dgm:spPr/>
+      <dgm:t>
+        <a:bodyPr/>
+        <a:lstStyle/>
+        <a:p>
+          <a:endParaRPr lang="en-US" sz="2000" dirty="0"/>
+        </a:p>
+      </dgm:t>
+    </dgm:pt>
+    <dgm:pt modelId="{EA6AAECD-62DE-4D9D-B790-874AB6B7BAE1}" type="parTrans" cxnId="{4B0E7D9C-D0F8-4DC0-93D1-6198F86D3DF6}">
+      <dgm:prSet/>
+      <dgm:spPr/>
+      <dgm:t>
+        <a:bodyPr/>
+        <a:lstStyle/>
+        <a:p>
+          <a:endParaRPr lang="en-US"/>
+        </a:p>
+      </dgm:t>
+    </dgm:pt>
+    <dgm:pt modelId="{6EA6C52A-B8EC-4766-AFBA-FC63D41A1339}" type="sibTrans" cxnId="{4B0E7D9C-D0F8-4DC0-93D1-6198F86D3DF6}">
+      <dgm:prSet/>
+      <dgm:spPr/>
+      <dgm:t>
+        <a:bodyPr/>
+        <a:lstStyle/>
+        <a:p>
+          <a:endParaRPr lang="en-US"/>
+        </a:p>
+      </dgm:t>
+    </dgm:pt>
+    <dgm:pt modelId="{37DDB56E-1999-4AE9-B3A2-281DC5BB6371}">
+      <dgm:prSet phldrT="[Text]" phldr="1" custT="1"/>
+      <dgm:spPr/>
+      <dgm:t>
+        <a:bodyPr/>
+        <a:lstStyle/>
+        <a:p>
+          <a:endParaRPr lang="en-US" sz="2000"/>
+        </a:p>
+      </dgm:t>
+    </dgm:pt>
+    <dgm:pt modelId="{33AAA74D-9F93-40EC-B5FF-81E94C4DF77A}" type="parTrans" cxnId="{486A906C-AF3C-41B5-B666-79E54A07E133}">
+      <dgm:prSet/>
+      <dgm:spPr/>
+      <dgm:t>
+        <a:bodyPr/>
+        <a:lstStyle/>
+        <a:p>
+          <a:endParaRPr lang="en-US"/>
+        </a:p>
+      </dgm:t>
+    </dgm:pt>
+    <dgm:pt modelId="{7ED73FE7-2CD2-4015-9588-60B020231480}" type="sibTrans" cxnId="{486A906C-AF3C-41B5-B666-79E54A07E133}">
+      <dgm:prSet/>
+      <dgm:spPr/>
+      <dgm:t>
+        <a:bodyPr/>
+        <a:lstStyle/>
+        <a:p>
+          <a:endParaRPr lang="en-US"/>
+        </a:p>
+      </dgm:t>
+    </dgm:pt>
+    <dgm:pt modelId="{648FE4C9-EB36-406E-9B38-C533FE163D96}">
+      <dgm:prSet phldrT="[Text]" custT="1"/>
+      <dgm:spPr/>
+      <dgm:t>
+        <a:bodyPr/>
+        <a:lstStyle/>
+        <a:p>
+          <a:r>
+            <a:rPr lang="en-US" sz="2000" dirty="0"/>
+            <a:t>Neural Net</a:t>
+          </a:r>
+        </a:p>
+      </dgm:t>
+    </dgm:pt>
+    <dgm:pt modelId="{EC7A3B53-E318-4E17-B990-F1A3CB402428}" type="parTrans" cxnId="{426ED3F0-ABB6-41BB-A33A-98984ADFC6FD}">
+      <dgm:prSet/>
+      <dgm:spPr/>
+      <dgm:t>
+        <a:bodyPr/>
+        <a:lstStyle/>
+        <a:p>
+          <a:endParaRPr lang="en-US"/>
+        </a:p>
+      </dgm:t>
+    </dgm:pt>
+    <dgm:pt modelId="{6C71CE9C-9A2A-4B7E-AAB5-ECF751D2011E}" type="sibTrans" cxnId="{426ED3F0-ABB6-41BB-A33A-98984ADFC6FD}">
+      <dgm:prSet/>
+      <dgm:spPr/>
+      <dgm:t>
+        <a:bodyPr/>
+        <a:lstStyle/>
+        <a:p>
+          <a:endParaRPr lang="en-US"/>
+        </a:p>
+      </dgm:t>
+    </dgm:pt>
+    <dgm:pt modelId="{4D91F83C-842C-41A0-AF28-56476AD32335}">
+      <dgm:prSet phldrT="[Text]" phldr="1" custT="1"/>
+      <dgm:spPr/>
+      <dgm:t>
+        <a:bodyPr/>
+        <a:lstStyle/>
+        <a:p>
+          <a:endParaRPr lang="en-US" sz="2000" dirty="0"/>
+        </a:p>
+      </dgm:t>
+    </dgm:pt>
+    <dgm:pt modelId="{D8560B95-096E-4CBF-B773-7E24C7BE0BAE}" type="parTrans" cxnId="{044B5B4D-9BA4-4440-B681-3C26D5D3D342}">
+      <dgm:prSet/>
+      <dgm:spPr/>
+      <dgm:t>
+        <a:bodyPr/>
+        <a:lstStyle/>
+        <a:p>
+          <a:endParaRPr lang="en-US"/>
+        </a:p>
+      </dgm:t>
+    </dgm:pt>
+    <dgm:pt modelId="{6FBE864F-9378-4E83-89D3-7D0F89F6C25A}" type="sibTrans" cxnId="{044B5B4D-9BA4-4440-B681-3C26D5D3D342}">
+      <dgm:prSet/>
+      <dgm:spPr/>
+      <dgm:t>
+        <a:bodyPr/>
+        <a:lstStyle/>
+        <a:p>
+          <a:endParaRPr lang="en-US"/>
+        </a:p>
+      </dgm:t>
+    </dgm:pt>
+    <dgm:pt modelId="{146E3B88-E8A3-4EBA-9861-EF668551891D}">
+      <dgm:prSet phldrT="[Text]" phldr="1" custT="1"/>
+      <dgm:spPr/>
+      <dgm:t>
+        <a:bodyPr/>
+        <a:lstStyle/>
+        <a:p>
+          <a:endParaRPr lang="en-US" sz="2000" dirty="0"/>
+        </a:p>
+      </dgm:t>
+    </dgm:pt>
+    <dgm:pt modelId="{BBAAF584-0E15-416F-88DA-F8057C3F640C}" type="parTrans" cxnId="{3A700A3E-9619-495A-8F84-70F81AEBE848}">
+      <dgm:prSet/>
+      <dgm:spPr/>
+      <dgm:t>
+        <a:bodyPr/>
+        <a:lstStyle/>
+        <a:p>
+          <a:endParaRPr lang="en-US"/>
+        </a:p>
+      </dgm:t>
+    </dgm:pt>
+    <dgm:pt modelId="{684D6F63-CBC6-4E48-8364-AB6E60644A2E}" type="sibTrans" cxnId="{3A700A3E-9619-495A-8F84-70F81AEBE848}">
+      <dgm:prSet/>
+      <dgm:spPr/>
+      <dgm:t>
+        <a:bodyPr/>
+        <a:lstStyle/>
+        <a:p>
+          <a:endParaRPr lang="en-US"/>
+        </a:p>
+      </dgm:t>
+    </dgm:pt>
+    <dgm:pt modelId="{99CE1582-0AAD-4E95-AB1D-9007017844D4}">
+      <dgm:prSet phldrT="[Text]" custT="1"/>
+      <dgm:spPr/>
+      <dgm:t>
+        <a:bodyPr/>
+        <a:lstStyle/>
+        <a:p>
+          <a:r>
+            <a:rPr lang="en-US" sz="2000" dirty="0"/>
+            <a:t>Random Forest</a:t>
+          </a:r>
+        </a:p>
+      </dgm:t>
+    </dgm:pt>
+    <dgm:pt modelId="{BE2EEECF-B5AA-43EA-AED6-E804B913CD85}" type="parTrans" cxnId="{CB33FD76-8C91-4AF8-8EBC-C63FC2D9F9A1}">
+      <dgm:prSet/>
+      <dgm:spPr/>
+      <dgm:t>
+        <a:bodyPr/>
+        <a:lstStyle/>
+        <a:p>
+          <a:endParaRPr lang="en-US"/>
+        </a:p>
+      </dgm:t>
+    </dgm:pt>
+    <dgm:pt modelId="{AB842EB1-B059-4631-8B4E-1B8E231BDAC2}" type="sibTrans" cxnId="{CB33FD76-8C91-4AF8-8EBC-C63FC2D9F9A1}">
+      <dgm:prSet/>
+      <dgm:spPr/>
+      <dgm:t>
+        <a:bodyPr/>
+        <a:lstStyle/>
+        <a:p>
+          <a:endParaRPr lang="en-US"/>
+        </a:p>
+      </dgm:t>
+    </dgm:pt>
+    <dgm:pt modelId="{13244804-DF7F-41ED-800F-9E21952489B3}">
+      <dgm:prSet phldrT="[Text]" phldr="1" custT="1"/>
+      <dgm:spPr/>
+      <dgm:t>
+        <a:bodyPr/>
+        <a:lstStyle/>
+        <a:p>
+          <a:endParaRPr lang="en-US" sz="2000" dirty="0"/>
+        </a:p>
+      </dgm:t>
+    </dgm:pt>
+    <dgm:pt modelId="{27485B83-C1DF-47AB-957B-D360F5F2187B}" type="parTrans" cxnId="{E2847A92-B976-4222-A67C-F3178A955959}">
+      <dgm:prSet/>
+      <dgm:spPr/>
+      <dgm:t>
+        <a:bodyPr/>
+        <a:lstStyle/>
+        <a:p>
+          <a:endParaRPr lang="en-US"/>
+        </a:p>
+      </dgm:t>
+    </dgm:pt>
+    <dgm:pt modelId="{67CE6561-62DD-4DE1-847B-F09427402B88}" type="sibTrans" cxnId="{E2847A92-B976-4222-A67C-F3178A955959}">
+      <dgm:prSet/>
+      <dgm:spPr/>
+      <dgm:t>
+        <a:bodyPr/>
+        <a:lstStyle/>
+        <a:p>
+          <a:endParaRPr lang="en-US"/>
+        </a:p>
+      </dgm:t>
+    </dgm:pt>
+    <dgm:pt modelId="{2984861A-41FE-4C38-B42C-29967F703A42}">
+      <dgm:prSet phldrT="[Text]" phldr="1" custT="1"/>
+      <dgm:spPr/>
+      <dgm:t>
+        <a:bodyPr/>
+        <a:lstStyle/>
+        <a:p>
+          <a:endParaRPr lang="en-US" sz="2000" dirty="0"/>
+        </a:p>
+      </dgm:t>
+    </dgm:pt>
+    <dgm:pt modelId="{4112759F-8BCB-4BC6-83F6-6F0C47C71CEB}" type="parTrans" cxnId="{BFBE0805-7BF0-4222-89E3-E7C13513FC4B}">
+      <dgm:prSet/>
+      <dgm:spPr/>
+      <dgm:t>
+        <a:bodyPr/>
+        <a:lstStyle/>
+        <a:p>
+          <a:endParaRPr lang="en-US"/>
+        </a:p>
+      </dgm:t>
+    </dgm:pt>
+    <dgm:pt modelId="{F3FE44AC-3970-4D4A-A929-3F8432B6B1D4}" type="sibTrans" cxnId="{BFBE0805-7BF0-4222-89E3-E7C13513FC4B}">
+      <dgm:prSet/>
+      <dgm:spPr/>
+      <dgm:t>
+        <a:bodyPr/>
+        <a:lstStyle/>
+        <a:p>
+          <a:endParaRPr lang="en-US"/>
+        </a:p>
+      </dgm:t>
+    </dgm:pt>
+    <dgm:pt modelId="{C4AF49DF-4D0B-4409-842E-9FFE653E6C69}" type="pres">
+      <dgm:prSet presAssocID="{D04CFBC0-9D5E-4287-8547-183AB4A3B617}" presName="linearFlow" presStyleCnt="0">
+        <dgm:presLayoutVars>
+          <dgm:dir/>
+          <dgm:animLvl val="lvl"/>
+          <dgm:resizeHandles val="exact"/>
+        </dgm:presLayoutVars>
+      </dgm:prSet>
+      <dgm:spPr/>
+    </dgm:pt>
+    <dgm:pt modelId="{CF0879A1-ACDE-4EDF-8E9A-641C81B39F06}" type="pres">
+      <dgm:prSet presAssocID="{B307596A-F680-4045-BF7F-F9CB52F3B002}" presName="composite" presStyleCnt="0"/>
+      <dgm:spPr/>
+    </dgm:pt>
+    <dgm:pt modelId="{1FB642F2-5973-4E4D-A95D-8502E173DA69}" type="pres">
+      <dgm:prSet presAssocID="{B307596A-F680-4045-BF7F-F9CB52F3B002}" presName="parentText" presStyleLbl="alignNode1" presStyleIdx="0" presStyleCnt="3">
+        <dgm:presLayoutVars>
+          <dgm:chMax val="1"/>
+          <dgm:bulletEnabled val="1"/>
+        </dgm:presLayoutVars>
+      </dgm:prSet>
+      <dgm:spPr/>
+    </dgm:pt>
+    <dgm:pt modelId="{9CEA4777-4A8C-4622-83EB-DD4BF734F25B}" type="pres">
+      <dgm:prSet presAssocID="{B307596A-F680-4045-BF7F-F9CB52F3B002}" presName="descendantText" presStyleLbl="alignAcc1" presStyleIdx="0" presStyleCnt="3">
+        <dgm:presLayoutVars>
+          <dgm:bulletEnabled val="1"/>
+        </dgm:presLayoutVars>
+      </dgm:prSet>
+      <dgm:spPr/>
+    </dgm:pt>
+    <dgm:pt modelId="{C30EC0D7-F9A2-4877-B570-37DF39487F06}" type="pres">
+      <dgm:prSet presAssocID="{AD392D25-5E88-4FBE-AB26-2E76AC3DF6D5}" presName="sp" presStyleCnt="0"/>
+      <dgm:spPr/>
+    </dgm:pt>
+    <dgm:pt modelId="{CB50DEB6-EFA4-4D1D-8187-474D5DAC4963}" type="pres">
+      <dgm:prSet presAssocID="{648FE4C9-EB36-406E-9B38-C533FE163D96}" presName="composite" presStyleCnt="0"/>
+      <dgm:spPr/>
+    </dgm:pt>
+    <dgm:pt modelId="{526A3ECB-FEA5-4220-8870-16588F0336D8}" type="pres">
+      <dgm:prSet presAssocID="{648FE4C9-EB36-406E-9B38-C533FE163D96}" presName="parentText" presStyleLbl="alignNode1" presStyleIdx="1" presStyleCnt="3">
+        <dgm:presLayoutVars>
+          <dgm:chMax val="1"/>
+          <dgm:bulletEnabled val="1"/>
+        </dgm:presLayoutVars>
+      </dgm:prSet>
+      <dgm:spPr/>
+    </dgm:pt>
+    <dgm:pt modelId="{347BE1A1-F995-4E94-A59A-4C69804335E2}" type="pres">
+      <dgm:prSet presAssocID="{648FE4C9-EB36-406E-9B38-C533FE163D96}" presName="descendantText" presStyleLbl="alignAcc1" presStyleIdx="1" presStyleCnt="3">
+        <dgm:presLayoutVars>
+          <dgm:bulletEnabled val="1"/>
+        </dgm:presLayoutVars>
+      </dgm:prSet>
+      <dgm:spPr/>
+    </dgm:pt>
+    <dgm:pt modelId="{57CED9A4-E27D-4749-B4C3-C8F195C0061E}" type="pres">
+      <dgm:prSet presAssocID="{6C71CE9C-9A2A-4B7E-AAB5-ECF751D2011E}" presName="sp" presStyleCnt="0"/>
+      <dgm:spPr/>
+    </dgm:pt>
+    <dgm:pt modelId="{776850D0-DC95-4A4E-9085-0DB8E552FB9F}" type="pres">
+      <dgm:prSet presAssocID="{99CE1582-0AAD-4E95-AB1D-9007017844D4}" presName="composite" presStyleCnt="0"/>
+      <dgm:spPr/>
+    </dgm:pt>
+    <dgm:pt modelId="{34AAE35E-110F-4C77-86E5-C424DD99D489}" type="pres">
+      <dgm:prSet presAssocID="{99CE1582-0AAD-4E95-AB1D-9007017844D4}" presName="parentText" presStyleLbl="alignNode1" presStyleIdx="2" presStyleCnt="3">
+        <dgm:presLayoutVars>
+          <dgm:chMax val="1"/>
+          <dgm:bulletEnabled val="1"/>
+        </dgm:presLayoutVars>
+      </dgm:prSet>
+      <dgm:spPr/>
+    </dgm:pt>
+    <dgm:pt modelId="{A9D307DA-2DD2-4587-9EEC-3BDC86BFB166}" type="pres">
+      <dgm:prSet presAssocID="{99CE1582-0AAD-4E95-AB1D-9007017844D4}" presName="descendantText" presStyleLbl="alignAcc1" presStyleIdx="2" presStyleCnt="3">
+        <dgm:presLayoutVars>
+          <dgm:bulletEnabled val="1"/>
+        </dgm:presLayoutVars>
+      </dgm:prSet>
+      <dgm:spPr/>
+    </dgm:pt>
+  </dgm:ptLst>
+  <dgm:cxnLst>
+    <dgm:cxn modelId="{E4599500-2CFD-4B20-9BCB-A889DCED07E5}" type="presOf" srcId="{16E3F1D2-F25C-4239-911D-27F65F3335D6}" destId="{9CEA4777-4A8C-4622-83EB-DD4BF734F25B}" srcOrd="0" destOrd="0" presId="urn:microsoft.com/office/officeart/2005/8/layout/chevron2"/>
+    <dgm:cxn modelId="{BFBE0805-7BF0-4222-89E3-E7C13513FC4B}" srcId="{99CE1582-0AAD-4E95-AB1D-9007017844D4}" destId="{2984861A-41FE-4C38-B42C-29967F703A42}" srcOrd="1" destOrd="0" parTransId="{4112759F-8BCB-4BC6-83F6-6F0C47C71CEB}" sibTransId="{F3FE44AC-3970-4D4A-A929-3F8432B6B1D4}"/>
+    <dgm:cxn modelId="{26152C1B-F7C0-4BB6-A318-40D47EB35674}" type="presOf" srcId="{2984861A-41FE-4C38-B42C-29967F703A42}" destId="{A9D307DA-2DD2-4587-9EEC-3BDC86BFB166}" srcOrd="0" destOrd="1" presId="urn:microsoft.com/office/officeart/2005/8/layout/chevron2"/>
+    <dgm:cxn modelId="{D1AD703D-F2FB-49E7-8D16-4ADA575B7984}" srcId="{D04CFBC0-9D5E-4287-8547-183AB4A3B617}" destId="{B307596A-F680-4045-BF7F-F9CB52F3B002}" srcOrd="0" destOrd="0" parTransId="{B8A79D03-3646-40BF-8578-6ACBFB698D74}" sibTransId="{AD392D25-5E88-4FBE-AB26-2E76AC3DF6D5}"/>
+    <dgm:cxn modelId="{3A700A3E-9619-495A-8F84-70F81AEBE848}" srcId="{648FE4C9-EB36-406E-9B38-C533FE163D96}" destId="{146E3B88-E8A3-4EBA-9861-EF668551891D}" srcOrd="1" destOrd="0" parTransId="{BBAAF584-0E15-416F-88DA-F8057C3F640C}" sibTransId="{684D6F63-CBC6-4E48-8364-AB6E60644A2E}"/>
+    <dgm:cxn modelId="{84D9803E-95A3-4FD1-9DC0-0D639C71EB70}" type="presOf" srcId="{99CE1582-0AAD-4E95-AB1D-9007017844D4}" destId="{34AAE35E-110F-4C77-86E5-C424DD99D489}" srcOrd="0" destOrd="0" presId="urn:microsoft.com/office/officeart/2005/8/layout/chevron2"/>
+    <dgm:cxn modelId="{8DBBBE40-D428-4588-BE24-5D579844DC0D}" type="presOf" srcId="{146E3B88-E8A3-4EBA-9861-EF668551891D}" destId="{347BE1A1-F995-4E94-A59A-4C69804335E2}" srcOrd="0" destOrd="1" presId="urn:microsoft.com/office/officeart/2005/8/layout/chevron2"/>
+    <dgm:cxn modelId="{7C83755F-126D-4D00-A3D0-3F60030EE216}" type="presOf" srcId="{4D91F83C-842C-41A0-AF28-56476AD32335}" destId="{347BE1A1-F995-4E94-A59A-4C69804335E2}" srcOrd="0" destOrd="0" presId="urn:microsoft.com/office/officeart/2005/8/layout/chevron2"/>
+    <dgm:cxn modelId="{486A906C-AF3C-41B5-B666-79E54A07E133}" srcId="{B307596A-F680-4045-BF7F-F9CB52F3B002}" destId="{37DDB56E-1999-4AE9-B3A2-281DC5BB6371}" srcOrd="1" destOrd="0" parTransId="{33AAA74D-9F93-40EC-B5FF-81E94C4DF77A}" sibTransId="{7ED73FE7-2CD2-4015-9588-60B020231480}"/>
+    <dgm:cxn modelId="{044B5B4D-9BA4-4440-B681-3C26D5D3D342}" srcId="{648FE4C9-EB36-406E-9B38-C533FE163D96}" destId="{4D91F83C-842C-41A0-AF28-56476AD32335}" srcOrd="0" destOrd="0" parTransId="{D8560B95-096E-4CBF-B773-7E24C7BE0BAE}" sibTransId="{6FBE864F-9378-4E83-89D3-7D0F89F6C25A}"/>
+    <dgm:cxn modelId="{CB33FD76-8C91-4AF8-8EBC-C63FC2D9F9A1}" srcId="{D04CFBC0-9D5E-4287-8547-183AB4A3B617}" destId="{99CE1582-0AAD-4E95-AB1D-9007017844D4}" srcOrd="2" destOrd="0" parTransId="{BE2EEECF-B5AA-43EA-AED6-E804B913CD85}" sibTransId="{AB842EB1-B059-4631-8B4E-1B8E231BDAC2}"/>
+    <dgm:cxn modelId="{EE11F75A-90FF-4CC9-B552-DAD90142E493}" type="presOf" srcId="{13244804-DF7F-41ED-800F-9E21952489B3}" destId="{A9D307DA-2DD2-4587-9EEC-3BDC86BFB166}" srcOrd="0" destOrd="0" presId="urn:microsoft.com/office/officeart/2005/8/layout/chevron2"/>
+    <dgm:cxn modelId="{E2847A92-B976-4222-A67C-F3178A955959}" srcId="{99CE1582-0AAD-4E95-AB1D-9007017844D4}" destId="{13244804-DF7F-41ED-800F-9E21952489B3}" srcOrd="0" destOrd="0" parTransId="{27485B83-C1DF-47AB-957B-D360F5F2187B}" sibTransId="{67CE6561-62DD-4DE1-847B-F09427402B88}"/>
+    <dgm:cxn modelId="{4B0E7D9C-D0F8-4DC0-93D1-6198F86D3DF6}" srcId="{B307596A-F680-4045-BF7F-F9CB52F3B002}" destId="{16E3F1D2-F25C-4239-911D-27F65F3335D6}" srcOrd="0" destOrd="0" parTransId="{EA6AAECD-62DE-4D9D-B790-874AB6B7BAE1}" sibTransId="{6EA6C52A-B8EC-4766-AFBA-FC63D41A1339}"/>
+    <dgm:cxn modelId="{EA0FE5B4-E0E0-422B-954F-C1D54942D5B5}" type="presOf" srcId="{D04CFBC0-9D5E-4287-8547-183AB4A3B617}" destId="{C4AF49DF-4D0B-4409-842E-9FFE653E6C69}" srcOrd="0" destOrd="0" presId="urn:microsoft.com/office/officeart/2005/8/layout/chevron2"/>
+    <dgm:cxn modelId="{1BD145D5-6913-44B0-838C-5F8E0CC3017E}" type="presOf" srcId="{B307596A-F680-4045-BF7F-F9CB52F3B002}" destId="{1FB642F2-5973-4E4D-A95D-8502E173DA69}" srcOrd="0" destOrd="0" presId="urn:microsoft.com/office/officeart/2005/8/layout/chevron2"/>
+    <dgm:cxn modelId="{A1138EE4-0254-4BEC-90DA-A017A68D08F5}" type="presOf" srcId="{648FE4C9-EB36-406E-9B38-C533FE163D96}" destId="{526A3ECB-FEA5-4220-8870-16588F0336D8}" srcOrd="0" destOrd="0" presId="urn:microsoft.com/office/officeart/2005/8/layout/chevron2"/>
+    <dgm:cxn modelId="{426ED3F0-ABB6-41BB-A33A-98984ADFC6FD}" srcId="{D04CFBC0-9D5E-4287-8547-183AB4A3B617}" destId="{648FE4C9-EB36-406E-9B38-C533FE163D96}" srcOrd="1" destOrd="0" parTransId="{EC7A3B53-E318-4E17-B990-F1A3CB402428}" sibTransId="{6C71CE9C-9A2A-4B7E-AAB5-ECF751D2011E}"/>
+    <dgm:cxn modelId="{8F6894FE-5C35-441F-9F9D-D1F400D1701F}" type="presOf" srcId="{37DDB56E-1999-4AE9-B3A2-281DC5BB6371}" destId="{9CEA4777-4A8C-4622-83EB-DD4BF734F25B}" srcOrd="0" destOrd="1" presId="urn:microsoft.com/office/officeart/2005/8/layout/chevron2"/>
+    <dgm:cxn modelId="{56BC2176-EBC3-493A-802F-17C1BEB6ECA1}" type="presParOf" srcId="{C4AF49DF-4D0B-4409-842E-9FFE653E6C69}" destId="{CF0879A1-ACDE-4EDF-8E9A-641C81B39F06}" srcOrd="0" destOrd="0" presId="urn:microsoft.com/office/officeart/2005/8/layout/chevron2"/>
+    <dgm:cxn modelId="{63986024-E452-4E67-97CA-BA32D0BB7593}" type="presParOf" srcId="{CF0879A1-ACDE-4EDF-8E9A-641C81B39F06}" destId="{1FB642F2-5973-4E4D-A95D-8502E173DA69}" srcOrd="0" destOrd="0" presId="urn:microsoft.com/office/officeart/2005/8/layout/chevron2"/>
+    <dgm:cxn modelId="{84DC9E03-B201-447F-A065-965648D9FE76}" type="presParOf" srcId="{CF0879A1-ACDE-4EDF-8E9A-641C81B39F06}" destId="{9CEA4777-4A8C-4622-83EB-DD4BF734F25B}" srcOrd="1" destOrd="0" presId="urn:microsoft.com/office/officeart/2005/8/layout/chevron2"/>
+    <dgm:cxn modelId="{9EB4E9D4-42E9-4238-8693-BCF33FCC4605}" type="presParOf" srcId="{C4AF49DF-4D0B-4409-842E-9FFE653E6C69}" destId="{C30EC0D7-F9A2-4877-B570-37DF39487F06}" srcOrd="1" destOrd="0" presId="urn:microsoft.com/office/officeart/2005/8/layout/chevron2"/>
+    <dgm:cxn modelId="{2CE020A2-CCF9-46DF-B0E5-0DF266237F77}" type="presParOf" srcId="{C4AF49DF-4D0B-4409-842E-9FFE653E6C69}" destId="{CB50DEB6-EFA4-4D1D-8187-474D5DAC4963}" srcOrd="2" destOrd="0" presId="urn:microsoft.com/office/officeart/2005/8/layout/chevron2"/>
+    <dgm:cxn modelId="{6103D647-94D3-4DB0-B361-3389858CE869}" type="presParOf" srcId="{CB50DEB6-EFA4-4D1D-8187-474D5DAC4963}" destId="{526A3ECB-FEA5-4220-8870-16588F0336D8}" srcOrd="0" destOrd="0" presId="urn:microsoft.com/office/officeart/2005/8/layout/chevron2"/>
+    <dgm:cxn modelId="{89CD0926-1556-478F-B98C-03E96AB5B8DB}" type="presParOf" srcId="{CB50DEB6-EFA4-4D1D-8187-474D5DAC4963}" destId="{347BE1A1-F995-4E94-A59A-4C69804335E2}" srcOrd="1" destOrd="0" presId="urn:microsoft.com/office/officeart/2005/8/layout/chevron2"/>
+    <dgm:cxn modelId="{F2DFEE7C-16E2-4180-84B3-A497CDA8DC10}" type="presParOf" srcId="{C4AF49DF-4D0B-4409-842E-9FFE653E6C69}" destId="{57CED9A4-E27D-4749-B4C3-C8F195C0061E}" srcOrd="3" destOrd="0" presId="urn:microsoft.com/office/officeart/2005/8/layout/chevron2"/>
+    <dgm:cxn modelId="{BE9E7503-F704-48BC-83FB-D736E6F0FF4A}" type="presParOf" srcId="{C4AF49DF-4D0B-4409-842E-9FFE653E6C69}" destId="{776850D0-DC95-4A4E-9085-0DB8E552FB9F}" srcOrd="4" destOrd="0" presId="urn:microsoft.com/office/officeart/2005/8/layout/chevron2"/>
+    <dgm:cxn modelId="{D0870DDA-CA31-4780-BD42-F4A784927AC7}" type="presParOf" srcId="{776850D0-DC95-4A4E-9085-0DB8E552FB9F}" destId="{34AAE35E-110F-4C77-86E5-C424DD99D489}" srcOrd="0" destOrd="0" presId="urn:microsoft.com/office/officeart/2005/8/layout/chevron2"/>
+    <dgm:cxn modelId="{4C713CC5-73D9-4443-9CD1-5A59051400CC}" type="presParOf" srcId="{776850D0-DC95-4A4E-9085-0DB8E552FB9F}" destId="{A9D307DA-2DD2-4587-9EEC-3BDC86BFB166}" srcOrd="1" destOrd="0" presId="urn:microsoft.com/office/officeart/2005/8/layout/chevron2"/>
+  </dgm:cxnLst>
+  <dgm:bg/>
+  <dgm:whole/>
+  <dgm:extLst>
+    <a:ext uri="http://schemas.microsoft.com/office/drawing/2008/diagram">
+      <dsp:dataModelExt xmlns:dsp="http://schemas.microsoft.com/office/drawing/2008/diagram" relId="rId6" minVer="http://schemas.openxmlformats.org/drawingml/2006/diagram"/>
+    </a:ext>
+  </dgm:extLst>
+</dgm:dataModel>
+</file>
+
+<file path=ppt/diagrams/drawing1.xml><?xml version="1.0" encoding="utf-8"?>
+<dsp:drawing xmlns:dgm="http://schemas.openxmlformats.org/drawingml/2006/diagram" xmlns:dsp="http://schemas.microsoft.com/office/drawing/2008/diagram" xmlns:a="http://schemas.openxmlformats.org/drawingml/2006/main">
+  <dsp:spTree>
+    <dsp:nvGrpSpPr>
+      <dsp:cNvPr id="0" name=""/>
+      <dsp:cNvGrpSpPr/>
+    </dsp:nvGrpSpPr>
+    <dsp:grpSpPr/>
+    <dsp:sp modelId="{1FB642F2-5973-4E4D-A95D-8502E173DA69}">
+      <dsp:nvSpPr>
+        <dsp:cNvPr id="0" name=""/>
+        <dsp:cNvSpPr/>
+      </dsp:nvSpPr>
+      <dsp:spPr>
+        <a:xfrm rot="5400000">
+          <a:off x="-257280" y="262520"/>
+          <a:ext cx="1715204" cy="1200643"/>
+        </a:xfrm>
+        <a:prstGeom prst="chevron">
+          <a:avLst/>
+        </a:prstGeom>
+        <a:solidFill>
+          <a:schemeClr val="accent1">
+            <a:hueOff val="0"/>
+            <a:satOff val="0"/>
+            <a:lumOff val="0"/>
+            <a:alphaOff val="0"/>
+          </a:schemeClr>
+        </a:solidFill>
+        <a:ln w="15875" cap="flat" cmpd="sng" algn="ctr">
+          <a:solidFill>
+            <a:schemeClr val="accent1">
+              <a:hueOff val="0"/>
+              <a:satOff val="0"/>
+              <a:lumOff val="0"/>
+              <a:alphaOff val="0"/>
+            </a:schemeClr>
+          </a:solidFill>
+          <a:prstDash val="solid"/>
+        </a:ln>
+        <a:effectLst/>
+      </dsp:spPr>
+      <dsp:style>
+        <a:lnRef idx="2">
+          <a:scrgbClr r="0" g="0" b="0"/>
+        </a:lnRef>
+        <a:fillRef idx="1">
+          <a:scrgbClr r="0" g="0" b="0"/>
+        </a:fillRef>
+        <a:effectRef idx="0">
+          <a:scrgbClr r="0" g="0" b="0"/>
+        </a:effectRef>
+        <a:fontRef idx="minor">
+          <a:schemeClr val="lt1"/>
+        </a:fontRef>
+      </dsp:style>
+      <dsp:txBody>
+        <a:bodyPr spcFirstLastPara="0" vert="horz" wrap="square" lIns="12700" tIns="12700" rIns="12700" bIns="12700" numCol="1" spcCol="1270" anchor="ctr" anchorCtr="0">
+          <a:noAutofit/>
+        </a:bodyPr>
+        <a:lstStyle/>
+        <a:p>
+          <a:pPr marL="0" lvl="0" indent="0" algn="ctr" defTabSz="889000">
+            <a:lnSpc>
+              <a:spcPct val="90000"/>
+            </a:lnSpc>
+            <a:spcBef>
+              <a:spcPct val="0"/>
+            </a:spcBef>
+            <a:spcAft>
+              <a:spcPct val="35000"/>
+            </a:spcAft>
+            <a:buNone/>
+          </a:pPr>
+          <a:r>
+            <a:rPr lang="en-US" sz="2000" kern="1200" dirty="0"/>
+            <a:t>Linear</a:t>
+          </a:r>
+        </a:p>
+      </dsp:txBody>
+      <dsp:txXfrm rot="-5400000">
+        <a:off x="1" y="605562"/>
+        <a:ext cx="1200643" cy="514561"/>
+      </dsp:txXfrm>
+    </dsp:sp>
+    <dsp:sp modelId="{9CEA4777-4A8C-4622-83EB-DD4BF734F25B}">
+      <dsp:nvSpPr>
+        <dsp:cNvPr id="0" name=""/>
+        <dsp:cNvSpPr/>
+      </dsp:nvSpPr>
+      <dsp:spPr>
+        <a:xfrm rot="5400000">
+          <a:off x="4447100" y="-3241217"/>
+          <a:ext cx="1114883" cy="7607796"/>
+        </a:xfrm>
+        <a:prstGeom prst="round2SameRect">
+          <a:avLst/>
+        </a:prstGeom>
+        <a:solidFill>
+          <a:schemeClr val="lt1">
+            <a:alpha val="90000"/>
+            <a:hueOff val="0"/>
+            <a:satOff val="0"/>
+            <a:lumOff val="0"/>
+            <a:alphaOff val="0"/>
+          </a:schemeClr>
+        </a:solidFill>
+        <a:ln w="15875" cap="flat" cmpd="sng" algn="ctr">
+          <a:solidFill>
+            <a:schemeClr val="accent1">
+              <a:hueOff val="0"/>
+              <a:satOff val="0"/>
+              <a:lumOff val="0"/>
+              <a:alphaOff val="0"/>
+            </a:schemeClr>
+          </a:solidFill>
+          <a:prstDash val="solid"/>
+        </a:ln>
+        <a:effectLst/>
+      </dsp:spPr>
+      <dsp:style>
+        <a:lnRef idx="2">
+          <a:scrgbClr r="0" g="0" b="0"/>
+        </a:lnRef>
+        <a:fillRef idx="1">
+          <a:scrgbClr r="0" g="0" b="0"/>
+        </a:fillRef>
+        <a:effectRef idx="0">
+          <a:scrgbClr r="0" g="0" b="0"/>
+        </a:effectRef>
+        <a:fontRef idx="minor"/>
+      </dsp:style>
+      <dsp:txBody>
+        <a:bodyPr spcFirstLastPara="0" vert="horz" wrap="square" lIns="142240" tIns="12700" rIns="12700" bIns="12700" numCol="1" spcCol="1270" anchor="ctr" anchorCtr="0">
+          <a:noAutofit/>
+        </a:bodyPr>
+        <a:lstStyle/>
+        <a:p>
+          <a:pPr marL="228600" lvl="1" indent="-228600" algn="l" defTabSz="889000">
+            <a:lnSpc>
+              <a:spcPct val="90000"/>
+            </a:lnSpc>
+            <a:spcBef>
+              <a:spcPct val="0"/>
+            </a:spcBef>
+            <a:spcAft>
+              <a:spcPct val="15000"/>
+            </a:spcAft>
+            <a:buChar char="•"/>
+          </a:pPr>
+          <a:endParaRPr lang="en-US" sz="2000" kern="1200" dirty="0"/>
+        </a:p>
+        <a:p>
+          <a:pPr marL="228600" lvl="1" indent="-228600" algn="l" defTabSz="889000">
+            <a:lnSpc>
+              <a:spcPct val="90000"/>
+            </a:lnSpc>
+            <a:spcBef>
+              <a:spcPct val="0"/>
+            </a:spcBef>
+            <a:spcAft>
+              <a:spcPct val="15000"/>
+            </a:spcAft>
+            <a:buChar char="•"/>
+          </a:pPr>
+          <a:endParaRPr lang="en-US" sz="2000" kern="1200"/>
+        </a:p>
+      </dsp:txBody>
+      <dsp:txXfrm rot="-5400000">
+        <a:off x="1200644" y="59663"/>
+        <a:ext cx="7553372" cy="1006035"/>
+      </dsp:txXfrm>
+    </dsp:sp>
+    <dsp:sp modelId="{526A3ECB-FEA5-4220-8870-16588F0336D8}">
+      <dsp:nvSpPr>
+        <dsp:cNvPr id="0" name=""/>
+        <dsp:cNvSpPr/>
+      </dsp:nvSpPr>
+      <dsp:spPr>
+        <a:xfrm rot="5400000">
+          <a:off x="-257280" y="1785141"/>
+          <a:ext cx="1715204" cy="1200643"/>
+        </a:xfrm>
+        <a:prstGeom prst="chevron">
+          <a:avLst/>
+        </a:prstGeom>
+        <a:solidFill>
+          <a:schemeClr val="accent1">
+            <a:hueOff val="0"/>
+            <a:satOff val="0"/>
+            <a:lumOff val="0"/>
+            <a:alphaOff val="0"/>
+          </a:schemeClr>
+        </a:solidFill>
+        <a:ln w="15875" cap="flat" cmpd="sng" algn="ctr">
+          <a:solidFill>
+            <a:schemeClr val="accent1">
+              <a:hueOff val="0"/>
+              <a:satOff val="0"/>
+              <a:lumOff val="0"/>
+              <a:alphaOff val="0"/>
+            </a:schemeClr>
+          </a:solidFill>
+          <a:prstDash val="solid"/>
+        </a:ln>
+        <a:effectLst/>
+      </dsp:spPr>
+      <dsp:style>
+        <a:lnRef idx="2">
+          <a:scrgbClr r="0" g="0" b="0"/>
+        </a:lnRef>
+        <a:fillRef idx="1">
+          <a:scrgbClr r="0" g="0" b="0"/>
+        </a:fillRef>
+        <a:effectRef idx="0">
+          <a:scrgbClr r="0" g="0" b="0"/>
+        </a:effectRef>
+        <a:fontRef idx="minor">
+          <a:schemeClr val="lt1"/>
+        </a:fontRef>
+      </dsp:style>
+      <dsp:txBody>
+        <a:bodyPr spcFirstLastPara="0" vert="horz" wrap="square" lIns="12700" tIns="12700" rIns="12700" bIns="12700" numCol="1" spcCol="1270" anchor="ctr" anchorCtr="0">
+          <a:noAutofit/>
+        </a:bodyPr>
+        <a:lstStyle/>
+        <a:p>
+          <a:pPr marL="0" lvl="0" indent="0" algn="ctr" defTabSz="889000">
+            <a:lnSpc>
+              <a:spcPct val="90000"/>
+            </a:lnSpc>
+            <a:spcBef>
+              <a:spcPct val="0"/>
+            </a:spcBef>
+            <a:spcAft>
+              <a:spcPct val="35000"/>
+            </a:spcAft>
+            <a:buNone/>
+          </a:pPr>
+          <a:r>
+            <a:rPr lang="en-US" sz="2000" kern="1200" dirty="0"/>
+            <a:t>Neural Net</a:t>
+          </a:r>
+        </a:p>
+      </dsp:txBody>
+      <dsp:txXfrm rot="-5400000">
+        <a:off x="1" y="2128183"/>
+        <a:ext cx="1200643" cy="514561"/>
+      </dsp:txXfrm>
+    </dsp:sp>
+    <dsp:sp modelId="{347BE1A1-F995-4E94-A59A-4C69804335E2}">
+      <dsp:nvSpPr>
+        <dsp:cNvPr id="0" name=""/>
+        <dsp:cNvSpPr/>
+      </dsp:nvSpPr>
+      <dsp:spPr>
+        <a:xfrm rot="5400000">
+          <a:off x="4446806" y="-1718302"/>
+          <a:ext cx="1115469" cy="7607796"/>
+        </a:xfrm>
+        <a:prstGeom prst="round2SameRect">
+          <a:avLst/>
+        </a:prstGeom>
+        <a:solidFill>
+          <a:schemeClr val="lt1">
+            <a:alpha val="90000"/>
+            <a:hueOff val="0"/>
+            <a:satOff val="0"/>
+            <a:lumOff val="0"/>
+            <a:alphaOff val="0"/>
+          </a:schemeClr>
+        </a:solidFill>
+        <a:ln w="15875" cap="flat" cmpd="sng" algn="ctr">
+          <a:solidFill>
+            <a:schemeClr val="accent1">
+              <a:hueOff val="0"/>
+              <a:satOff val="0"/>
+              <a:lumOff val="0"/>
+              <a:alphaOff val="0"/>
+            </a:schemeClr>
+          </a:solidFill>
+          <a:prstDash val="solid"/>
+        </a:ln>
+        <a:effectLst/>
+      </dsp:spPr>
+      <dsp:style>
+        <a:lnRef idx="2">
+          <a:scrgbClr r="0" g="0" b="0"/>
+        </a:lnRef>
+        <a:fillRef idx="1">
+          <a:scrgbClr r="0" g="0" b="0"/>
+        </a:fillRef>
+        <a:effectRef idx="0">
+          <a:scrgbClr r="0" g="0" b="0"/>
+        </a:effectRef>
+        <a:fontRef idx="minor"/>
+      </dsp:style>
+      <dsp:txBody>
+        <a:bodyPr spcFirstLastPara="0" vert="horz" wrap="square" lIns="142240" tIns="12700" rIns="12700" bIns="12700" numCol="1" spcCol="1270" anchor="ctr" anchorCtr="0">
+          <a:noAutofit/>
+        </a:bodyPr>
+        <a:lstStyle/>
+        <a:p>
+          <a:pPr marL="228600" lvl="1" indent="-228600" algn="l" defTabSz="889000">
+            <a:lnSpc>
+              <a:spcPct val="90000"/>
+            </a:lnSpc>
+            <a:spcBef>
+              <a:spcPct val="0"/>
+            </a:spcBef>
+            <a:spcAft>
+              <a:spcPct val="15000"/>
+            </a:spcAft>
+            <a:buChar char="•"/>
+          </a:pPr>
+          <a:endParaRPr lang="en-US" sz="2000" kern="1200" dirty="0"/>
+        </a:p>
+        <a:p>
+          <a:pPr marL="228600" lvl="1" indent="-228600" algn="l" defTabSz="889000">
+            <a:lnSpc>
+              <a:spcPct val="90000"/>
+            </a:lnSpc>
+            <a:spcBef>
+              <a:spcPct val="0"/>
+            </a:spcBef>
+            <a:spcAft>
+              <a:spcPct val="15000"/>
+            </a:spcAft>
+            <a:buChar char="•"/>
+          </a:pPr>
+          <a:endParaRPr lang="en-US" sz="2000" kern="1200" dirty="0"/>
+        </a:p>
+      </dsp:txBody>
+      <dsp:txXfrm rot="-5400000">
+        <a:off x="1200643" y="1582314"/>
+        <a:ext cx="7553343" cy="1006563"/>
+      </dsp:txXfrm>
+    </dsp:sp>
+    <dsp:sp modelId="{34AAE35E-110F-4C77-86E5-C424DD99D489}">
+      <dsp:nvSpPr>
+        <dsp:cNvPr id="0" name=""/>
+        <dsp:cNvSpPr/>
+      </dsp:nvSpPr>
+      <dsp:spPr>
+        <a:xfrm rot="5400000">
+          <a:off x="-257280" y="3307763"/>
+          <a:ext cx="1715204" cy="1200643"/>
+        </a:xfrm>
+        <a:prstGeom prst="chevron">
+          <a:avLst/>
+        </a:prstGeom>
+        <a:solidFill>
+          <a:schemeClr val="accent1">
+            <a:hueOff val="0"/>
+            <a:satOff val="0"/>
+            <a:lumOff val="0"/>
+            <a:alphaOff val="0"/>
+          </a:schemeClr>
+        </a:solidFill>
+        <a:ln w="15875" cap="flat" cmpd="sng" algn="ctr">
+          <a:solidFill>
+            <a:schemeClr val="accent1">
+              <a:hueOff val="0"/>
+              <a:satOff val="0"/>
+              <a:lumOff val="0"/>
+              <a:alphaOff val="0"/>
+            </a:schemeClr>
+          </a:solidFill>
+          <a:prstDash val="solid"/>
+        </a:ln>
+        <a:effectLst/>
+      </dsp:spPr>
+      <dsp:style>
+        <a:lnRef idx="2">
+          <a:scrgbClr r="0" g="0" b="0"/>
+        </a:lnRef>
+        <a:fillRef idx="1">
+          <a:scrgbClr r="0" g="0" b="0"/>
+        </a:fillRef>
+        <a:effectRef idx="0">
+          <a:scrgbClr r="0" g="0" b="0"/>
+        </a:effectRef>
+        <a:fontRef idx="minor">
+          <a:schemeClr val="lt1"/>
+        </a:fontRef>
+      </dsp:style>
+      <dsp:txBody>
+        <a:bodyPr spcFirstLastPara="0" vert="horz" wrap="square" lIns="12700" tIns="12700" rIns="12700" bIns="12700" numCol="1" spcCol="1270" anchor="ctr" anchorCtr="0">
+          <a:noAutofit/>
+        </a:bodyPr>
+        <a:lstStyle/>
+        <a:p>
+          <a:pPr marL="0" lvl="0" indent="0" algn="ctr" defTabSz="889000">
+            <a:lnSpc>
+              <a:spcPct val="90000"/>
+            </a:lnSpc>
+            <a:spcBef>
+              <a:spcPct val="0"/>
+            </a:spcBef>
+            <a:spcAft>
+              <a:spcPct val="35000"/>
+            </a:spcAft>
+            <a:buNone/>
+          </a:pPr>
+          <a:r>
+            <a:rPr lang="en-US" sz="2000" kern="1200" dirty="0"/>
+            <a:t>Random Forest</a:t>
+          </a:r>
+        </a:p>
+      </dsp:txBody>
+      <dsp:txXfrm rot="-5400000">
+        <a:off x="1" y="3650805"/>
+        <a:ext cx="1200643" cy="514561"/>
+      </dsp:txXfrm>
+    </dsp:sp>
+    <dsp:sp modelId="{A9D307DA-2DD2-4587-9EEC-3BDC86BFB166}">
+      <dsp:nvSpPr>
+        <dsp:cNvPr id="0" name=""/>
+        <dsp:cNvSpPr/>
+      </dsp:nvSpPr>
+      <dsp:spPr>
+        <a:xfrm rot="5400000">
+          <a:off x="4447100" y="-195974"/>
+          <a:ext cx="1114883" cy="7607796"/>
+        </a:xfrm>
+        <a:prstGeom prst="round2SameRect">
+          <a:avLst/>
+        </a:prstGeom>
+        <a:solidFill>
+          <a:schemeClr val="lt1">
+            <a:alpha val="90000"/>
+            <a:hueOff val="0"/>
+            <a:satOff val="0"/>
+            <a:lumOff val="0"/>
+            <a:alphaOff val="0"/>
+          </a:schemeClr>
+        </a:solidFill>
+        <a:ln w="15875" cap="flat" cmpd="sng" algn="ctr">
+          <a:solidFill>
+            <a:schemeClr val="accent1">
+              <a:hueOff val="0"/>
+              <a:satOff val="0"/>
+              <a:lumOff val="0"/>
+              <a:alphaOff val="0"/>
+            </a:schemeClr>
+          </a:solidFill>
+          <a:prstDash val="solid"/>
+        </a:ln>
+        <a:effectLst/>
+      </dsp:spPr>
+      <dsp:style>
+        <a:lnRef idx="2">
+          <a:scrgbClr r="0" g="0" b="0"/>
+        </a:lnRef>
+        <a:fillRef idx="1">
+          <a:scrgbClr r="0" g="0" b="0"/>
+        </a:fillRef>
+        <a:effectRef idx="0">
+          <a:scrgbClr r="0" g="0" b="0"/>
+        </a:effectRef>
+        <a:fontRef idx="minor"/>
+      </dsp:style>
+      <dsp:txBody>
+        <a:bodyPr spcFirstLastPara="0" vert="horz" wrap="square" lIns="142240" tIns="12700" rIns="12700" bIns="12700" numCol="1" spcCol="1270" anchor="ctr" anchorCtr="0">
+          <a:noAutofit/>
+        </a:bodyPr>
+        <a:lstStyle/>
+        <a:p>
+          <a:pPr marL="228600" lvl="1" indent="-228600" algn="l" defTabSz="889000">
+            <a:lnSpc>
+              <a:spcPct val="90000"/>
+            </a:lnSpc>
+            <a:spcBef>
+              <a:spcPct val="0"/>
+            </a:spcBef>
+            <a:spcAft>
+              <a:spcPct val="15000"/>
+            </a:spcAft>
+            <a:buChar char="•"/>
+          </a:pPr>
+          <a:endParaRPr lang="en-US" sz="2000" kern="1200" dirty="0"/>
+        </a:p>
+        <a:p>
+          <a:pPr marL="228600" lvl="1" indent="-228600" algn="l" defTabSz="889000">
+            <a:lnSpc>
+              <a:spcPct val="90000"/>
+            </a:lnSpc>
+            <a:spcBef>
+              <a:spcPct val="0"/>
+            </a:spcBef>
+            <a:spcAft>
+              <a:spcPct val="15000"/>
+            </a:spcAft>
+            <a:buChar char="•"/>
+          </a:pPr>
+          <a:endParaRPr lang="en-US" sz="2000" kern="1200" dirty="0"/>
+        </a:p>
+      </dsp:txBody>
+      <dsp:txXfrm rot="-5400000">
+        <a:off x="1200644" y="3104906"/>
+        <a:ext cx="7553372" cy="1006035"/>
+      </dsp:txXfrm>
+    </dsp:sp>
+  </dsp:spTree>
+</dsp:drawing>
+</file>
+
+<file path=ppt/diagrams/layout1.xml><?xml version="1.0" encoding="utf-8"?>
+<dgm:layoutDef xmlns:dgm="http://schemas.openxmlformats.org/drawingml/2006/diagram" xmlns:a="http://schemas.openxmlformats.org/drawingml/2006/main" uniqueId="urn:microsoft.com/office/officeart/2005/8/layout/chevron2">
+  <dgm:title val=""/>
+  <dgm:desc val=""/>
+  <dgm:catLst>
+    <dgm:cat type="process" pri="12000"/>
+    <dgm:cat type="list" pri="16000"/>
+    <dgm:cat type="convert" pri="11000"/>
+  </dgm:catLst>
+  <dgm:sampData>
+    <dgm:dataModel>
+      <dgm:ptLst>
+        <dgm:pt modelId="0" type="doc"/>
+        <dgm:pt modelId="1">
+          <dgm:prSet phldr="1"/>
+        </dgm:pt>
+        <dgm:pt modelId="11">
+          <dgm:prSet phldr="1"/>
+        </dgm:pt>
+        <dgm:pt modelId="12">
+          <dgm:prSet phldr="1"/>
+        </dgm:pt>
+        <dgm:pt modelId="2">
+          <dgm:prSet phldr="1"/>
+        </dgm:pt>
+        <dgm:pt modelId="21">
+          <dgm:prSet phldr="1"/>
+        </dgm:pt>
+        <dgm:pt modelId="22">
+          <dgm:prSet phldr="1"/>
+        </dgm:pt>
+        <dgm:pt modelId="3">
+          <dgm:prSet phldr="1"/>
+        </dgm:pt>
+        <dgm:pt modelId="31">
+          <dgm:prSet phldr="1"/>
+        </dgm:pt>
+        <dgm:pt modelId="32">
+          <dgm:prSet phldr="1"/>
+        </dgm:pt>
+      </dgm:ptLst>
+      <dgm:cxnLst>
+        <dgm:cxn modelId="4" srcId="0" destId="1" srcOrd="0" destOrd="0"/>
+        <dgm:cxn modelId="5" srcId="0" destId="2" srcOrd="1" destOrd="0"/>
+        <dgm:cxn modelId="6" srcId="0" destId="3" srcOrd="2" destOrd="0"/>
+        <dgm:cxn modelId="13" srcId="1" destId="11" srcOrd="0" destOrd="0"/>
+        <dgm:cxn modelId="14" srcId="1" destId="12" srcOrd="1" destOrd="0"/>
+        <dgm:cxn modelId="23" srcId="2" destId="21" srcOrd="0" destOrd="0"/>
+        <dgm:cxn modelId="24" srcId="2" destId="22" srcOrd="1" destOrd="0"/>
+        <dgm:cxn modelId="33" srcId="3" destId="31" srcOrd="0" destOrd="0"/>
+        <dgm:cxn modelId="34" srcId="3" destId="32" srcOrd="1" destOrd="0"/>
+      </dgm:cxnLst>
+      <dgm:bg/>
+      <dgm:whole/>
+    </dgm:dataModel>
+  </dgm:sampData>
+  <dgm:styleData>
+    <dgm:dataModel>
+      <dgm:ptLst>
+        <dgm:pt modelId="0" type="doc"/>
+        <dgm:pt modelId="1"/>
+      </dgm:ptLst>
+      <dgm:cxnLst>
+        <dgm:cxn modelId="4" srcId="0" destId="1" srcOrd="0" destOrd="0"/>
+      </dgm:cxnLst>
+      <dgm:bg/>
+      <dgm:whole/>
+    </dgm:dataModel>
+  </dgm:styleData>
+  <dgm:clrData>
+    <dgm:dataModel>
+      <dgm:ptLst>
+        <dgm:pt modelId="0" type="doc"/>
+        <dgm:pt modelId="1"/>
+        <dgm:pt modelId="11"/>
+        <dgm:pt modelId="2"/>
+        <dgm:pt modelId="21"/>
+        <dgm:pt modelId="3"/>
+        <dgm:pt modelId="31"/>
+        <dgm:pt modelId="4"/>
+        <dgm:pt modelId="41"/>
+      </dgm:ptLst>
+      <dgm:cxnLst>
+        <dgm:cxn modelId="5" srcId="0" destId="1" srcOrd="0" destOrd="0"/>
+        <dgm:cxn modelId="6" srcId="0" destId="2" srcOrd="1" destOrd="0"/>
+        <dgm:cxn modelId="7" srcId="0" destId="3" srcOrd="2" destOrd="0"/>
+        <dgm:cxn modelId="8" srcId="0" destId="4" srcOrd="3" destOrd="0"/>
+        <dgm:cxn modelId="13" srcId="1" destId="11" srcOrd="0" destOrd="0"/>
+        <dgm:cxn modelId="23" srcId="2" destId="21" srcOrd="0" destOrd="0"/>
+        <dgm:cxn modelId="33" srcId="3" destId="31" srcOrd="0" destOrd="0"/>
+        <dgm:cxn modelId="43" srcId="4" destId="41" srcOrd="0" destOrd="0"/>
+      </dgm:cxnLst>
+      <dgm:bg/>
+      <dgm:whole/>
+    </dgm:dataModel>
+  </dgm:clrData>
+  <dgm:layoutNode name="linearFlow">
+    <dgm:varLst>
+      <dgm:dir/>
+      <dgm:animLvl val="lvl"/>
+      <dgm:resizeHandles val="exact"/>
+    </dgm:varLst>
+    <dgm:alg type="lin">
+      <dgm:param type="linDir" val="fromT"/>
+      <dgm:param type="nodeHorzAlign" val="l"/>
+    </dgm:alg>
+    <dgm:shape xmlns:r="http://schemas.openxmlformats.org/officeDocument/2006/relationships" r:blip="">
+      <dgm:adjLst/>
+    </dgm:shape>
+    <dgm:presOf/>
+    <dgm:constrLst>
+      <dgm:constr type="h" for="ch" forName="composite" refType="h"/>
+      <dgm:constr type="w" for="ch" forName="composite" refType="w"/>
+      <dgm:constr type="h" for="des" forName="parentText" op="equ"/>
+      <dgm:constr type="h" for="ch" forName="sp" val="-14.88"/>
+      <dgm:constr type="h" for="ch" forName="sp" refType="w" refFor="des" refForName="parentText" op="gte" fact="-0.3"/>
+      <dgm:constr type="primFontSz" for="des" forName="parentText" op="equ" val="65"/>
+      <dgm:constr type="primFontSz" for="des" forName="descendantText" op="equ" val="65"/>
+    </dgm:constrLst>
+    <dgm:ruleLst/>
+    <dgm:forEach name="Name0" axis="ch" ptType="node">
+      <dgm:layoutNode name="composite">
+        <dgm:alg type="composite"/>
+        <dgm:shape xmlns:r="http://schemas.openxmlformats.org/officeDocument/2006/relationships" r:blip="">
+          <dgm:adjLst/>
+        </dgm:shape>
+        <dgm:presOf/>
+        <dgm:choose name="Name1">
+          <dgm:if name="Name2" func="var" arg="dir" op="equ" val="norm">
+            <dgm:constrLst>
+              <dgm:constr type="t" for="ch" forName="parentText"/>
+              <dgm:constr type="l" for="ch" forName="parentText"/>
+              <dgm:constr type="w" for="ch" forName="parentText" refType="w" fact="0.4"/>
+              <dgm:constr type="h" for="ch" forName="parentText" refType="h"/>
+              <dgm:constr type="w" for="ch" forName="parentText" refType="w" op="lte" fact="0.5"/>
+              <dgm:constr type="w" for="ch" forName="parentText" refType="h" refFor="ch" refForName="parentText" op="lte" fact="0.7"/>
+              <dgm:constr type="h" for="ch" forName="parentText" refType="w" refFor="ch" refForName="parentText" op="lte" fact="3"/>
+              <dgm:constr type="l" for="ch" forName="descendantText" refType="w" refFor="ch" refForName="parentText"/>
+              <dgm:constr type="w" for="ch" forName="descendantText" refType="w"/>
+              <dgm:constr type="wOff" for="ch" forName="descendantText" refType="w" refFor="ch" refForName="parentText" fact="-1"/>
+              <dgm:constr type="t" for="ch" forName="descendantText"/>
+              <dgm:constr type="b" for="ch" forName="descendantText" refType="h" refFor="ch" refForName="parentText"/>
+              <dgm:constr type="bOff" for="ch" forName="descendantText" refType="w" refFor="ch" refForName="parentText" fact="-0.5"/>
+            </dgm:constrLst>
+          </dgm:if>
+          <dgm:else name="Name3">
+            <dgm:constrLst>
+              <dgm:constr type="t" for="ch" forName="parentText"/>
+              <dgm:constr type="r" for="ch" forName="parentText" refType="w"/>
+              <dgm:constr type="w" for="ch" forName="parentText" refType="w" fact="0.4"/>
+              <dgm:constr type="h" for="ch" forName="parentText" refType="h"/>
+              <dgm:constr type="w" for="ch" forName="parentText" refType="w" op="lte" fact="0.5"/>
+              <dgm:constr type="w" for="ch" forName="parentText" refType="h" refFor="ch" refForName="parentText" op="lte" fact="0.7"/>
+              <dgm:constr type="h" for="ch" forName="parentText" refType="w" refFor="ch" refForName="parentText" op="lte" fact="3"/>
+              <dgm:constr type="l" for="ch" forName="descendantText"/>
+              <dgm:constr type="w" for="ch" forName="descendantText" refType="w"/>
+              <dgm:constr type="wOff" for="ch" forName="descendantText" refType="w" refFor="ch" refForName="parentText" fact="-1"/>
+              <dgm:constr type="t" for="ch" forName="descendantText"/>
+              <dgm:constr type="b" for="ch" forName="descendantText" refType="h" refFor="ch" refForName="parentText"/>
+              <dgm:constr type="bOff" for="ch" forName="descendantText" refType="w" refFor="ch" refForName="parentText" fact="-0.5"/>
+            </dgm:constrLst>
+          </dgm:else>
+        </dgm:choose>
+        <dgm:ruleLst/>
+        <dgm:layoutNode name="parentText" styleLbl="alignNode1">
+          <dgm:varLst>
+            <dgm:chMax val="1"/>
+            <dgm:bulletEnabled val="1"/>
+          </dgm:varLst>
+          <dgm:alg type="tx"/>
+          <dgm:shape xmlns:r="http://schemas.openxmlformats.org/officeDocument/2006/relationships" rot="90" type="chevron" r:blip="">
+            <dgm:adjLst/>
+          </dgm:shape>
+          <dgm:presOf axis="self" ptType="node"/>
+          <dgm:constrLst>
+            <dgm:constr type="lMarg" refType="primFontSz" fact="0.05"/>
+            <dgm:constr type="rMarg" refType="primFontSz" fact="0.05"/>
+            <dgm:constr type="tMarg" refType="primFontSz" fact="0.05"/>
+            <dgm:constr type="bMarg" refType="primFontSz" fact="0.05"/>
+          </dgm:constrLst>
+          <dgm:ruleLst>
+            <dgm:rule type="h" val="100" fact="NaN" max="NaN"/>
+            <dgm:rule type="primFontSz" val="24" fact="NaN" max="NaN"/>
+            <dgm:rule type="h" val="110" fact="NaN" max="NaN"/>
+            <dgm:rule type="primFontSz" val="18" fact="NaN" max="NaN"/>
+            <dgm:rule type="h" val="INF" fact="NaN" max="NaN"/>
+            <dgm:rule type="primFontSz" val="5" fact="NaN" max="NaN"/>
+          </dgm:ruleLst>
+        </dgm:layoutNode>
+        <dgm:layoutNode name="descendantText" styleLbl="alignAcc1">
+          <dgm:varLst>
+            <dgm:bulletEnabled val="1"/>
+          </dgm:varLst>
+          <dgm:choose name="Name4">
+            <dgm:if name="Name5" func="var" arg="dir" op="equ" val="norm">
+              <dgm:alg type="tx">
+                <dgm:param type="stBulletLvl" val="1"/>
+                <dgm:param type="txAnchorVertCh" val="mid"/>
+              </dgm:alg>
+              <dgm:shape xmlns:r="http://schemas.openxmlformats.org/officeDocument/2006/relationships" rot="90" type="round2SameRect" r:blip="">
+                <dgm:adjLst/>
+              </dgm:shape>
+            </dgm:if>
+            <dgm:else name="Name6">
+              <dgm:alg type="tx">
+                <dgm:param type="stBulletLvl" val="1"/>
+                <dgm:param type="txAnchorVertCh" val="mid"/>
+              </dgm:alg>
+              <dgm:shape xmlns:r="http://schemas.openxmlformats.org/officeDocument/2006/relationships" rot="-90" type="round2SameRect" r:blip="">
+                <dgm:adjLst/>
+              </dgm:shape>
+            </dgm:else>
+          </dgm:choose>
+          <dgm:presOf axis="des" ptType="node"/>
+          <dgm:choose name="Name7">
+            <dgm:if name="Name8" func="var" arg="dir" op="equ" val="norm">
+              <dgm:constrLst>
+                <dgm:constr type="secFontSz" refType="primFontSz"/>
+                <dgm:constr type="tMarg" refType="primFontSz" fact="0.05"/>
+                <dgm:constr type="bMarg" refType="primFontSz" fact="0.05"/>
+                <dgm:constr type="rMarg" refType="primFontSz" fact="0.05"/>
+              </dgm:constrLst>
+            </dgm:if>
+            <dgm:else name="Name9">
+              <dgm:constrLst>
+                <dgm:constr type="secFontSz" refType="primFontSz"/>
+                <dgm:constr type="tMarg" refType="primFontSz" fact="0.05"/>
+                <dgm:constr type="bMarg" refType="primFontSz" fact="0.05"/>
+                <dgm:constr type="lMarg" refType="primFontSz" fact="0.05"/>
+              </dgm:constrLst>
+            </dgm:else>
+          </dgm:choose>
+          <dgm:ruleLst>
+            <dgm:rule type="primFontSz" val="5" fact="NaN" max="NaN"/>
+          </dgm:ruleLst>
+        </dgm:layoutNode>
+      </dgm:layoutNode>
+      <dgm:forEach name="Name10" axis="followSib" ptType="sibTrans" cnt="1">
+        <dgm:layoutNode name="sp">
+          <dgm:alg type="sp"/>
+          <dgm:shape xmlns:r="http://schemas.openxmlformats.org/officeDocument/2006/relationships" r:blip="">
+            <dgm:adjLst/>
+          </dgm:shape>
+          <dgm:presOf axis="self"/>
+          <dgm:constrLst>
+            <dgm:constr type="w" val="1"/>
+            <dgm:constr type="h" val="37.5"/>
+          </dgm:constrLst>
+          <dgm:ruleLst/>
+        </dgm:layoutNode>
+      </dgm:forEach>
+    </dgm:forEach>
+  </dgm:layoutNode>
+</dgm:layoutDef>
+</file>
+
+<file path=ppt/diagrams/quickStyle1.xml><?xml version="1.0" encoding="utf-8"?>
+<dgm:styleDef xmlns:dgm="http://schemas.openxmlformats.org/drawingml/2006/diagram" xmlns:a="http://schemas.openxmlformats.org/drawingml/2006/main" uniqueId="urn:microsoft.com/office/officeart/2005/8/quickstyle/simple1">
+  <dgm:title val=""/>
+  <dgm:desc val=""/>
+  <dgm:catLst>
+    <dgm:cat type="simple" pri="10100"/>
+  </dgm:catLst>
+  <dgm:scene3d>
+    <a:camera prst="orthographicFront"/>
+    <a:lightRig rig="threePt" dir="t"/>
+  </dgm:scene3d>
+  <dgm:styleLbl name="node0">
+    <dgm:scene3d>
+      <a:camera prst="orthographicFront"/>
+      <a:lightRig rig="threePt" dir="t"/>
+    </dgm:scene3d>
+    <dgm:sp3d/>
+    <dgm:txPr/>
+    <dgm:style>
+      <a:lnRef idx="2">
+        <a:scrgbClr r="0" g="0" b="0"/>
+      </a:lnRef>
+      <a:fillRef idx="1">
+        <a:scrgbClr r="0" g="0" b="0"/>
+      </a:fillRef>
+      <a:effectRef idx="0">
+        <a:scrgbClr r="0" g="0" b="0"/>
+      </a:effectRef>
+      <a:fontRef idx="minor">
+        <a:schemeClr val="lt1"/>
+      </a:fontRef>
+    </dgm:style>
+  </dgm:styleLbl>
+  <dgm:styleLbl name="lnNode1">
+    <dgm:scene3d>
+      <a:camera prst="orthographicFront"/>
+      <a:lightRig rig="threePt" dir="t"/>
+    </dgm:scene3d>
+    <dgm:sp3d/>
+    <dgm:txPr/>
+    <dgm:style>
+      <a:lnRef idx="2">
+        <a:scrgbClr r="0" g="0" b="0"/>
+      </a:lnRef>
+      <a:fillRef idx="1">
+        <a:scrgbClr r="0" g="0" b="0"/>
+      </a:fillRef>
+      <a:effectRef idx="0">
+        <a:scrgbClr r="0" g="0" b="0"/>
+      </a:effectRef>
+      <a:fontRef idx="minor">
+        <a:schemeClr val="lt1"/>
+      </a:fontRef>
+    </dgm:style>
+  </dgm:styleLbl>
+  <dgm:styleLbl name="vennNode1">
+    <dgm:scene3d>
+      <a:camera prst="orthographicFront"/>
+      <a:lightRig rig="threePt" dir="t"/>
+    </dgm:scene3d>
+    <dgm:sp3d/>
+    <dgm:txPr/>
+    <dgm:style>
+      <a:lnRef idx="2">
+        <a:scrgbClr r="0" g="0" b="0"/>
+      </a:lnRef>
+      <a:fillRef idx="1">
+        <a:scrgbClr r="0" g="0" b="0"/>
+      </a:fillRef>
+      <a:effectRef idx="0">
+        <a:scrgbClr r="0" g="0" b="0"/>
+      </a:effectRef>
+      <a:fontRef idx="minor">
+        <a:schemeClr val="tx1"/>
+      </a:fontRef>
+    </dgm:style>
+  </dgm:styleLbl>
+  <dgm:styleLbl name="alignNode1">
+    <dgm:scene3d>
+      <a:camera prst="orthographicFront"/>
+      <a:lightRig rig="threePt" dir="t"/>
+    </dgm:scene3d>
+    <dgm:sp3d/>
+    <dgm:txPr/>
+    <dgm:style>
+      <a:lnRef idx="2">
+        <a:scrgbClr r="0" g="0" b="0"/>
+      </a:lnRef>
+      <a:fillRef idx="1">
+        <a:scrgbClr r="0" g="0" b="0"/>
+      </a:fillRef>
+      <a:effectRef idx="0">
+        <a:scrgbClr r="0" g="0" b="0"/>
+      </a:effectRef>
+      <a:fontRef idx="minor">
+        <a:schemeClr val="lt1"/>
+      </a:fontRef>
+    </dgm:style>
+  </dgm:styleLbl>
+  <dgm:styleLbl name="node1">
+    <dgm:scene3d>
+      <a:camera prst="orthographicFront"/>
+      <a:lightRig rig="threePt" dir="t"/>
+    </dgm:scene3d>
+    <dgm:sp3d/>
+    <dgm:txPr/>
+    <dgm:style>
+      <a:lnRef idx="2">
+        <a:scrgbClr r="0" g="0" b="0"/>
+      </a:lnRef>
+      <a:fillRef idx="1">
+        <a:scrgbClr r="0" g="0" b="0"/>
+      </a:fillRef>
+      <a:effectRef idx="0">
+        <a:scrgbClr r="0" g="0" b="0"/>
+      </a:effectRef>
+      <a:fontRef idx="minor">
+        <a:schemeClr val="lt1"/>
+      </a:fontRef>
+    </dgm:style>
+  </dgm:styleLbl>
+  <dgm:styleLbl name="node2">
+    <dgm:scene3d>
+      <a:camera prst="orthographicFront"/>
+      <a:lightRig rig="threePt" dir="t"/>
+    </dgm:scene3d>
+    <dgm:sp3d/>
+    <dgm:txPr/>
+    <dgm:style>
+      <a:lnRef idx="2">
+        <a:scrgbClr r="0" g="0" b="0"/>
+      </a:lnRef>
+      <a:fillRef idx="1">
+        <a:scrgbClr r="0" g="0" b="0"/>
+      </a:fillRef>
+      <a:effectRef idx="0">
+        <a:scrgbClr r="0" g="0" b="0"/>
+      </a:effectRef>
+      <a:fontRef idx="minor">
+        <a:schemeClr val="lt1"/>
+      </a:fontRef>
+    </dgm:style>
+  </dgm:styleLbl>
+  <dgm:styleLbl name="node3">
+    <dgm:scene3d>
+      <a:camera prst="orthographicFront"/>
+      <a:lightRig rig="threePt" dir="t"/>
+    </dgm:scene3d>
+    <dgm:sp3d/>
+    <dgm:txPr/>
+    <dgm:style>
+      <a:lnRef idx="2">
+        <a:scrgbClr r="0" g="0" b="0"/>
+      </a:lnRef>
+      <a:fillRef idx="1">
+        <a:scrgbClr r="0" g="0" b="0"/>
+      </a:fillRef>
+      <a:effectRef idx="0">
+        <a:scrgbClr r="0" g="0" b="0"/>
+      </a:effectRef>
+      <a:fontRef idx="minor">
+        <a:schemeClr val="lt1"/>
+      </a:fontRef>
+    </dgm:style>
+  </dgm:styleLbl>
+  <dgm:styleLbl name="node4">
+    <dgm:scene3d>
+      <a:camera prst="orthographicFront"/>
+      <a:lightRig rig="threePt" dir="t"/>
+    </dgm:scene3d>
+    <dgm:sp3d/>
+    <dgm:txPr/>
+    <dgm:style>
+      <a:lnRef idx="2">
+        <a:scrgbClr r="0" g="0" b="0"/>
+      </a:lnRef>
+      <a:fillRef idx="1">
+        <a:scrgbClr r="0" g="0" b="0"/>
+      </a:fillRef>
+      <a:effectRef idx="0">
+        <a:scrgbClr r="0" g="0" b="0"/>
+      </a:effectRef>
+      <a:fontRef idx="minor">
+        <a:schemeClr val="lt1"/>
+      </a:fontRef>
+    </dgm:style>
+  </dgm:styleLbl>
+  <dgm:styleLbl name="fgImgPlace1">
+    <dgm:scene3d>
+      <a:camera prst="orthographicFront"/>
+      <a:lightRig rig="threePt" dir="t"/>
+    </dgm:scene3d>
+    <dgm:sp3d/>
+    <dgm:txPr/>
+    <dgm:style>
+      <a:lnRef idx="2">
+        <a:scrgbClr r="0" g="0" b="0"/>
+      </a:lnRef>
+      <a:fillRef idx="1">
+        <a:scrgbClr r="0" g="0" b="0"/>
+      </a:fillRef>
+      <a:effectRef idx="0">
+        <a:scrgbClr r="0" g="0" b="0"/>
+      </a:effectRef>
+      <a:fontRef idx="minor"/>
+    </dgm:style>
+  </dgm:styleLbl>
+  <dgm:styleLbl name="alignImgPlace1">
+    <dgm:scene3d>
+      <a:camera prst="orthographicFront"/>
+      <a:lightRig rig="threePt" dir="t"/>
+    </dgm:scene3d>
+    <dgm:sp3d/>
+    <dgm:txPr/>
+    <dgm:style>
+      <a:lnRef idx="2">
+        <a:scrgbClr r="0" g="0" b="0"/>
+      </a:lnRef>
+      <a:fillRef idx="1">
+        <a:scrgbClr r="0" g="0" b="0"/>
+      </a:fillRef>
+      <a:effectRef idx="0">
+        <a:scrgbClr r="0" g="0" b="0"/>
+      </a:effectRef>
+      <a:fontRef idx="minor"/>
+    </dgm:style>
+  </dgm:styleLbl>
+  <dgm:styleLbl name="bgImgPlace1">
+    <dgm:scene3d>
+      <a:camera prst="orthographicFront"/>
+      <a:lightRig rig="threePt" dir="t"/>
+    </dgm:scene3d>
+    <dgm:sp3d/>
+    <dgm:txPr/>
+    <dgm:style>
+      <a:lnRef idx="2">
+        <a:scrgbClr r="0" g="0" b="0"/>
+      </a:lnRef>
+      <a:fillRef idx="1">
+        <a:scrgbClr r="0" g="0" b="0"/>
+      </a:fillRef>
+      <a:effectRef idx="0">
+        <a:scrgbClr r="0" g="0" b="0"/>
+      </a:effectRef>
+      <a:fontRef idx="minor"/>
+    </dgm:style>
+  </dgm:styleLbl>
+  <dgm:styleLbl name="sibTrans2D1">
+    <dgm:scene3d>
+      <a:camera prst="orthographicFront"/>
+      <a:lightRig rig="threePt" dir="t"/>
+    </dgm:scene3d>
+    <dgm:sp3d/>
+    <dgm:txPr/>
+    <dgm:style>
+      <a:lnRef idx="0">
+        <a:scrgbClr r="0" g="0" b="0"/>
+      </a:lnRef>
+      <a:fillRef idx="1">
+        <a:scrgbClr r="0" g="0" b="0"/>
+      </a:fillRef>
+      <a:effectRef idx="0">
+        <a:scrgbClr r="0" g="0" b="0"/>
+      </a:effectRef>
+      <a:fontRef idx="minor">
+        <a:schemeClr val="lt1"/>
+      </a:fontRef>
+    </dgm:style>
+  </dgm:styleLbl>
+  <dgm:styleLbl name="fgSibTrans2D1">
+    <dgm:scene3d>
+      <a:camera prst="orthographicFront"/>
+      <a:lightRig rig="threePt" dir="t"/>
+    </dgm:scene3d>
+    <dgm:sp3d/>
+    <dgm:txPr/>
+    <dgm:style>
+      <a:lnRef idx="0">
+        <a:scrgbClr r="0" g="0" b="0"/>
+      </a:lnRef>
+      <a:fillRef idx="1">
+        <a:scrgbClr r="0" g="0" b="0"/>
+      </a:fillRef>
+      <a:effectRef idx="0">
+        <a:scrgbClr r="0" g="0" b="0"/>
+      </a:effectRef>
+      <a:fontRef idx="minor">
+        <a:schemeClr val="lt1"/>
+      </a:fontRef>
+    </dgm:style>
+  </dgm:styleLbl>
+  <dgm:styleLbl name="bgSibTrans2D1">
+    <dgm:scene3d>
+      <a:camera prst="orthographicFront"/>
+      <a:lightRig rig="threePt" dir="t"/>
+    </dgm:scene3d>
+    <dgm:sp3d/>
+    <dgm:txPr/>
+    <dgm:style>
+      <a:lnRef idx="0">
+        <a:scrgbClr r="0" g="0" b="0"/>
+      </a:lnRef>
+      <a:fillRef idx="1">
+        <a:scrgbClr r="0" g="0" b="0"/>
+      </a:fillRef>
+      <a:effectRef idx="0">
+        <a:scrgbClr r="0" g="0" b="0"/>
+      </a:effectRef>
+      <a:fontRef idx="minor">
+        <a:schemeClr val="lt1"/>
+      </a:fontRef>
+    </dgm:style>
+  </dgm:styleLbl>
+  <dgm:styleLbl name="sibTrans1D1">
+    <dgm:scene3d>
+      <a:camera prst="orthographicFront"/>
+      <a:lightRig rig="threePt" dir="t"/>
+    </dgm:scene3d>
+    <dgm:sp3d/>
+    <dgm:txPr/>
+    <dgm:style>
+      <a:lnRef idx="1">
+        <a:scrgbClr r="0" g="0" b="0"/>
+      </a:lnRef>
+      <a:fillRef idx="0">
+        <a:scrgbClr r="0" g="0" b="0"/>
+      </a:fillRef>
+      <a:effectRef idx="0">
+        <a:scrgbClr r="0" g="0" b="0"/>
+      </a:effectRef>
+      <a:fontRef idx="minor"/>
+    </dgm:style>
+  </dgm:styleLbl>
+  <dgm:styleLbl name="callout">
+    <dgm:scene3d>
+      <a:camera prst="orthographicFront"/>
+      <a:lightRig rig="threePt" dir="t"/>
+    </dgm:scene3d>
+    <dgm:sp3d/>
+    <dgm:txPr/>
+    <dgm:style>
+      <a:lnRef idx="2">
+        <a:scrgbClr r="0" g="0" b="0"/>
+      </a:lnRef>
+      <a:fillRef idx="1">
+        <a:scrgbClr r="0" g="0" b="0"/>
+      </a:fillRef>
+      <a:effectRef idx="0">
+        <a:scrgbClr r="0" g="0" b="0"/>
+      </a:effectRef>
+      <a:fontRef idx="minor"/>
+    </dgm:style>
+  </dgm:styleLbl>
+  <dgm:styleLbl name="asst0">
+    <dgm:scene3d>
+      <a:camera prst="orthographicFront"/>
+      <a:lightRig rig="threePt" dir="t"/>
+    </dgm:scene3d>
+    <dgm:sp3d/>
+    <dgm:txPr/>
+    <dgm:style>
+      <a:lnRef idx="2">
+        <a:scrgbClr r="0" g="0" b="0"/>
+      </a:lnRef>
+      <a:fillRef idx="1">
+        <a:scrgbClr r="0" g="0" b="0"/>
+      </a:fillRef>
+      <a:effectRef idx="0">
+        <a:scrgbClr r="0" g="0" b="0"/>
+      </a:effectRef>
+      <a:fontRef idx="minor">
+        <a:schemeClr val="lt1"/>
+      </a:fontRef>
+    </dgm:style>
+  </dgm:styleLbl>
+  <dgm:styleLbl name="asst1">
+    <dgm:scene3d>
+      <a:camera prst="orthographicFront"/>
+      <a:lightRig rig="threePt" dir="t"/>
+    </dgm:scene3d>
+    <dgm:sp3d/>
+    <dgm:txPr/>
+    <dgm:style>
+      <a:lnRef idx="2">
+        <a:scrgbClr r="0" g="0" b="0"/>
+      </a:lnRef>
+      <a:fillRef idx="1">
+        <a:scrgbClr r="0" g="0" b="0"/>
+      </a:fillRef>
+      <a:effectRef idx="0">
+        <a:scrgbClr r="0" g="0" b="0"/>
+      </a:effectRef>
+      <a:fontRef idx="minor">
+        <a:schemeClr val="lt1"/>
+      </a:fontRef>
+    </dgm:style>
+  </dgm:styleLbl>
+  <dgm:styleLbl name="asst2">
+    <dgm:scene3d>
+      <a:camera prst="orthographicFront"/>
+      <a:lightRig rig="threePt" dir="t"/>
+    </dgm:scene3d>
+    <dgm:sp3d/>
+    <dgm:txPr/>
+    <dgm:style>
+      <a:lnRef idx="2">
+        <a:scrgbClr r="0" g="0" b="0"/>
+      </a:lnRef>
+      <a:fillRef idx="1">
+        <a:scrgbClr r="0" g="0" b="0"/>
+      </a:fillRef>
+      <a:effectRef idx="0">
+        <a:scrgbClr r="0" g="0" b="0"/>
+      </a:effectRef>
+      <a:fontRef idx="minor">
+        <a:schemeClr val="lt1"/>
+      </a:fontRef>
+    </dgm:style>
+  </dgm:styleLbl>
+  <dgm:styleLbl name="asst3">
+    <dgm:scene3d>
+      <a:camera prst="orthographicFront"/>
+      <a:lightRig rig="threePt" dir="t"/>
+    </dgm:scene3d>
+    <dgm:sp3d/>
+    <dgm:txPr/>
+    <dgm:style>
+      <a:lnRef idx="2">
+        <a:scrgbClr r="0" g="0" b="0"/>
+      </a:lnRef>
+      <a:fillRef idx="1">
+        <a:scrgbClr r="0" g="0" b="0"/>
+      </a:fillRef>
+      <a:effectRef idx="0">
+        <a:scrgbClr r="0" g="0" b="0"/>
+      </a:effectRef>
+      <a:fontRef idx="minor">
+        <a:schemeClr val="lt1"/>
+      </a:fontRef>
+    </dgm:style>
+  </dgm:styleLbl>
+  <dgm:styleLbl name="asst4">
+    <dgm:scene3d>
+      <a:camera prst="orthographicFront"/>
+      <a:lightRig rig="threePt" dir="t"/>
+    </dgm:scene3d>
+    <dgm:sp3d/>
+    <dgm:txPr/>
+    <dgm:style>
+      <a:lnRef idx="2">
+        <a:scrgbClr r="0" g="0" b="0"/>
+      </a:lnRef>
+      <a:fillRef idx="1">
+        <a:scrgbClr r="0" g="0" b="0"/>
+      </a:fillRef>
+      <a:effectRef idx="0">
+        <a:scrgbClr r="0" g="0" b="0"/>
+      </a:effectRef>
+      <a:fontRef idx="minor">
+        <a:schemeClr val="lt1"/>
+      </a:fontRef>
+    </dgm:style>
+  </dgm:styleLbl>
+  <dgm:styleLbl name="parChTrans2D1">
+    <dgm:scene3d>
+      <a:camera prst="orthographicFront"/>
+      <a:lightRig rig="threePt" dir="t"/>
+    </dgm:scene3d>
+    <dgm:sp3d/>
+    <dgm:txPr/>
+    <dgm:style>
+      <a:lnRef idx="2">
+        <a:scrgbClr r="0" g="0" b="0"/>
+      </a:lnRef>
+      <a:fillRef idx="1">
+        <a:scrgbClr r="0" g="0" b="0"/>
+      </a:fillRef>
+      <a:effectRef idx="0">
+        <a:scrgbClr r="0" g="0" b="0"/>
+      </a:effectRef>
+      <a:fontRef idx="minor">
+        <a:schemeClr val="lt1"/>
+      </a:fontRef>
+    </dgm:style>
+  </dgm:styleLbl>
+  <dgm:styleLbl name="parChTrans2D2">
+    <dgm:scene3d>
+      <a:camera prst="orthographicFront"/>
+      <a:lightRig rig="threePt" dir="t"/>
+    </dgm:scene3d>
+    <dgm:sp3d/>
+    <dgm:txPr/>
+    <dgm:style>
+      <a:lnRef idx="2">
+        <a:scrgbClr r="0" g="0" b="0"/>
+      </a:lnRef>
+      <a:fillRef idx="1">
+        <a:scrgbClr r="0" g="0" b="0"/>
+      </a:fillRef>
+      <a:effectRef idx="0">
+        <a:scrgbClr r="0" g="0" b="0"/>
+      </a:effectRef>
+      <a:fontRef idx="minor">
+        <a:schemeClr val="lt1"/>
+      </a:fontRef>
+    </dgm:style>
+  </dgm:styleLbl>
+  <dgm:styleLbl name="parChTrans2D3">
+    <dgm:scene3d>
+      <a:camera prst="orthographicFront"/>
+      <a:lightRig rig="threePt" dir="t"/>
+    </dgm:scene3d>
+    <dgm:sp3d/>
+    <dgm:txPr/>
+    <dgm:style>
+      <a:lnRef idx="2">
+        <a:scrgbClr r="0" g="0" b="0"/>
+      </a:lnRef>
+      <a:fillRef idx="1">
+        <a:scrgbClr r="0" g="0" b="0"/>
+      </a:fillRef>
+      <a:effectRef idx="0">
+        <a:scrgbClr r="0" g="0" b="0"/>
+      </a:effectRef>
+      <a:fontRef idx="minor">
+        <a:schemeClr val="lt1"/>
+      </a:fontRef>
+    </dgm:style>
+  </dgm:styleLbl>
+  <dgm:styleLbl name="parChTrans2D4">
+    <dgm:scene3d>
+      <a:camera prst="orthographicFront"/>
+      <a:lightRig rig="threePt" dir="t"/>
+    </dgm:scene3d>
+    <dgm:sp3d/>
+    <dgm:txPr/>
+    <dgm:style>
+      <a:lnRef idx="2">
+        <a:scrgbClr r="0" g="0" b="0"/>
+      </a:lnRef>
+      <a:fillRef idx="1">
+        <a:scrgbClr r="0" g="0" b="0"/>
+      </a:fillRef>
+      <a:effectRef idx="0">
+        <a:scrgbClr r="0" g="0" b="0"/>
+      </a:effectRef>
+      <a:fontRef idx="minor">
+        <a:schemeClr val="lt1"/>
+      </a:fontRef>
+    </dgm:style>
+  </dgm:styleLbl>
+  <dgm:styleLbl name="parChTrans1D1">
+    <dgm:scene3d>
+      <a:camera prst="orthographicFront"/>
+      <a:lightRig rig="threePt" dir="t"/>
+    </dgm:scene3d>
+    <dgm:sp3d/>
+    <dgm:txPr/>
+    <dgm:style>
+      <a:lnRef idx="2">
+        <a:scrgbClr r="0" g="0" b="0"/>
+      </a:lnRef>
+      <a:fillRef idx="0">
+        <a:scrgbClr r="0" g="0" b="0"/>
+      </a:fillRef>
+      <a:effectRef idx="0">
+        <a:scrgbClr r="0" g="0" b="0"/>
+      </a:effectRef>
+      <a:fontRef idx="minor"/>
+    </dgm:style>
+  </dgm:styleLbl>
+  <dgm:styleLbl name="parChTrans1D2">
+    <dgm:scene3d>
+      <a:camera prst="orthographicFront"/>
+      <a:lightRig rig="threePt" dir="t"/>
+    </dgm:scene3d>
+    <dgm:sp3d/>
+    <dgm:txPr/>
+    <dgm:style>
+      <a:lnRef idx="2">
+        <a:scrgbClr r="0" g="0" b="0"/>
+      </a:lnRef>
+      <a:fillRef idx="0">
+        <a:scrgbClr r="0" g="0" b="0"/>
+      </a:fillRef>
+      <a:effectRef idx="0">
+        <a:scrgbClr r="0" g="0" b="0"/>
+      </a:effectRef>
+      <a:fontRef idx="minor"/>
+    </dgm:style>
+  </dgm:styleLbl>
+  <dgm:styleLbl name="parChTrans1D3">
+    <dgm:scene3d>
+      <a:camera prst="orthographicFront"/>
+      <a:lightRig rig="threePt" dir="t"/>
+    </dgm:scene3d>
+    <dgm:sp3d/>
+    <dgm:txPr/>
+    <dgm:style>
+      <a:lnRef idx="2">
+        <a:scrgbClr r="0" g="0" b="0"/>
+      </a:lnRef>
+      <a:fillRef idx="0">
+        <a:scrgbClr r="0" g="0" b="0"/>
+      </a:fillRef>
+      <a:effectRef idx="0">
+        <a:scrgbClr r="0" g="0" b="0"/>
+      </a:effectRef>
+      <a:fontRef idx="minor"/>
+    </dgm:style>
+  </dgm:styleLbl>
+  <dgm:styleLbl name="parChTrans1D4">
+    <dgm:scene3d>
+      <a:camera prst="orthographicFront"/>
+      <a:lightRig rig="threePt" dir="t"/>
+    </dgm:scene3d>
+    <dgm:sp3d/>
+    <dgm:txPr/>
+    <dgm:style>
+      <a:lnRef idx="2">
+        <a:scrgbClr r="0" g="0" b="0"/>
+      </a:lnRef>
+      <a:fillRef idx="0">
+        <a:scrgbClr r="0" g="0" b="0"/>
+      </a:fillRef>
+      <a:effectRef idx="0">
+        <a:scrgbClr r="0" g="0" b="0"/>
+      </a:effectRef>
+      <a:fontRef idx="minor"/>
+    </dgm:style>
+  </dgm:styleLbl>
+  <dgm:styleLbl name="fgAcc1">
+    <dgm:scene3d>
+      <a:camera prst="orthographicFront"/>
+      <a:lightRig rig="threePt" dir="t"/>
+    </dgm:scene3d>
+    <dgm:sp3d/>
+    <dgm:txPr/>
+    <dgm:style>
+      <a:lnRef idx="2">
+        <a:scrgbClr r="0" g="0" b="0"/>
+      </a:lnRef>
+      <a:fillRef idx="1">
+        <a:scrgbClr r="0" g="0" b="0"/>
+      </a:fillRef>
+      <a:effectRef idx="0">
+        <a:scrgbClr r="0" g="0" b="0"/>
+      </a:effectRef>
+      <a:fontRef idx="minor"/>
+    </dgm:style>
+  </dgm:styleLbl>
+  <dgm:styleLbl name="conFgAcc1">
+    <dgm:scene3d>
+      <a:camera prst="orthographicFront"/>
+      <a:lightRig rig="threePt" dir="t"/>
+    </dgm:scene3d>
+    <dgm:sp3d/>
+    <dgm:txPr/>
+    <dgm:style>
+      <a:lnRef idx="2">
+        <a:scrgbClr r="0" g="0" b="0"/>
+      </a:lnRef>
+      <a:fillRef idx="1">
+        <a:scrgbClr r="0" g="0" b="0"/>
+      </a:fillRef>
+      <a:effectRef idx="0">
+        <a:scrgbClr r="0" g="0" b="0"/>
+      </a:effectRef>
+      <a:fontRef idx="minor"/>
+    </dgm:style>
+  </dgm:styleLbl>
+  <dgm:styleLbl name="alignAcc1">
+    <dgm:scene3d>
+      <a:camera prst="orthographicFront"/>
+      <a:lightRig rig="threePt" dir="t"/>
+    </dgm:scene3d>
+    <dgm:sp3d/>
+    <dgm:txPr/>
+    <dgm:style>
+      <a:lnRef idx="2">
+        <a:scrgbClr r="0" g="0" b="0"/>
+      </a:lnRef>
+      <a:fillRef idx="1">
+        <a:scrgbClr r="0" g="0" b="0"/>
+      </a:fillRef>
+      <a:effectRef idx="0">
+        <a:scrgbClr r="0" g="0" b="0"/>
+      </a:effectRef>
+      <a:fontRef idx="minor"/>
+    </dgm:style>
+  </dgm:styleLbl>
+  <dgm:styleLbl name="trAlignAcc1">
+    <dgm:scene3d>
+      <a:camera prst="orthographicFront"/>
+      <a:lightRig rig="threePt" dir="t"/>
+    </dgm:scene3d>
+    <dgm:sp3d/>
+    <dgm:txPr/>
+    <dgm:style>
+      <a:lnRef idx="1">
+        <a:scrgbClr r="0" g="0" b="0"/>
+      </a:lnRef>
+      <a:fillRef idx="1">
+        <a:scrgbClr r="0" g="0" b="0"/>
+      </a:fillRef>
+      <a:effectRef idx="0">
+        <a:scrgbClr r="0" g="0" b="0"/>
+      </a:effectRef>
+      <a:fontRef idx="minor"/>
+    </dgm:style>
+  </dgm:styleLbl>
+  <dgm:styleLbl name="bgAcc1">
+    <dgm:scene3d>
+      <a:camera prst="orthographicFront"/>
+      <a:lightRig rig="threePt" dir="t"/>
+    </dgm:scene3d>
+    <dgm:sp3d/>
+    <dgm:txPr/>
+    <dgm:style>
+      <a:lnRef idx="2">
+        <a:scrgbClr r="0" g="0" b="0"/>
+      </a:lnRef>
+      <a:fillRef idx="1">
+        <a:scrgbClr r="0" g="0" b="0"/>
+      </a:fillRef>
+      <a:effectRef idx="0">
+        <a:scrgbClr r="0" g="0" b="0"/>
+      </a:effectRef>
+      <a:fontRef idx="minor"/>
+    </dgm:style>
+  </dgm:styleLbl>
+  <dgm:styleLbl name="solidFgAcc1">
+    <dgm:scene3d>
+      <a:camera prst="orthographicFront"/>
+      <a:lightRig rig="threePt" dir="t"/>
+    </dgm:scene3d>
+    <dgm:sp3d/>
+    <dgm:txPr/>
+    <dgm:style>
+      <a:lnRef idx="2">
+        <a:scrgbClr r="0" g="0" b="0"/>
+      </a:lnRef>
+      <a:fillRef idx="1">
+        <a:scrgbClr r="0" g="0" b="0"/>
+      </a:fillRef>
+      <a:effectRef idx="0">
+        <a:scrgbClr r="0" g="0" b="0"/>
+      </a:effectRef>
+      <a:fontRef idx="minor"/>
+    </dgm:style>
+  </dgm:styleLbl>
+  <dgm:styleLbl name="solidAlignAcc1">
+    <dgm:scene3d>
+      <a:camera prst="orthographicFront"/>
+      <a:lightRig rig="threePt" dir="t"/>
+    </dgm:scene3d>
+    <dgm:sp3d/>
+    <dgm:txPr/>
+    <dgm:style>
+      <a:lnRef idx="2">
+        <a:scrgbClr r="0" g="0" b="0"/>
+      </a:lnRef>
+      <a:fillRef idx="1">
+        <a:scrgbClr r="0" g="0" b="0"/>
+      </a:fillRef>
+      <a:effectRef idx="0">
+        <a:scrgbClr r="0" g="0" b="0"/>
+      </a:effectRef>
+      <a:fontRef idx="minor"/>
+    </dgm:style>
+  </dgm:styleLbl>
+  <dgm:styleLbl name="solidBgAcc1">
+    <dgm:scene3d>
+      <a:camera prst="orthographicFront"/>
+      <a:lightRig rig="threePt" dir="t"/>
+    </dgm:scene3d>
+    <dgm:sp3d/>
+    <dgm:txPr/>
+    <dgm:style>
+      <a:lnRef idx="2">
+        <a:scrgbClr r="0" g="0" b="0"/>
+      </a:lnRef>
+      <a:fillRef idx="1">
+        <a:scrgbClr r="0" g="0" b="0"/>
+      </a:fillRef>
+      <a:effectRef idx="0">
+        <a:scrgbClr r="0" g="0" b="0"/>
+      </a:effectRef>
+      <a:fontRef idx="minor"/>
+    </dgm:style>
+  </dgm:styleLbl>
+  <dgm:styleLbl name="fgAccFollowNode1">
+    <dgm:scene3d>
+      <a:camera prst="orthographicFront"/>
+      <a:lightRig rig="threePt" dir="t"/>
+    </dgm:scene3d>
+    <dgm:sp3d/>
+    <dgm:txPr/>
+    <dgm:style>
+      <a:lnRef idx="2">
+        <a:scrgbClr r="0" g="0" b="0"/>
+      </a:lnRef>
+      <a:fillRef idx="1">
+        <a:scrgbClr r="0" g="0" b="0"/>
+      </a:fillRef>
+      <a:effectRef idx="0">
+        <a:scrgbClr r="0" g="0" b="0"/>
+      </a:effectRef>
+      <a:fontRef idx="minor"/>
+    </dgm:style>
+  </dgm:styleLbl>
+  <dgm:styleLbl name="alignAccFollowNode1">
+    <dgm:scene3d>
+      <a:camera prst="orthographicFront"/>
+      <a:lightRig rig="threePt" dir="t"/>
+    </dgm:scene3d>
+    <dgm:sp3d/>
+    <dgm:txPr/>
+    <dgm:style>
+      <a:lnRef idx="2">
+        <a:scrgbClr r="0" g="0" b="0"/>
+      </a:lnRef>
+      <a:fillRef idx="1">
+        <a:scrgbClr r="0" g="0" b="0"/>
+      </a:fillRef>
+      <a:effectRef idx="0">
+        <a:scrgbClr r="0" g="0" b="0"/>
+      </a:effectRef>
+      <a:fontRef idx="minor"/>
+    </dgm:style>
+  </dgm:styleLbl>
+  <dgm:styleLbl name="bgAccFollowNode1">
+    <dgm:scene3d>
+      <a:camera prst="orthographicFront"/>
+      <a:lightRig rig="threePt" dir="t"/>
+    </dgm:scene3d>
+    <dgm:sp3d/>
+    <dgm:txPr/>
+    <dgm:style>
+      <a:lnRef idx="2">
+        <a:scrgbClr r="0" g="0" b="0"/>
+      </a:lnRef>
+      <a:fillRef idx="1">
+        <a:scrgbClr r="0" g="0" b="0"/>
+      </a:fillRef>
+      <a:effectRef idx="0">
+        <a:scrgbClr r="0" g="0" b="0"/>
+      </a:effectRef>
+      <a:fontRef idx="minor"/>
+    </dgm:style>
+  </dgm:styleLbl>
+  <dgm:styleLbl name="fgAcc0">
+    <dgm:scene3d>
+      <a:camera prst="orthographicFront"/>
+      <a:lightRig rig="threePt" dir="t"/>
+    </dgm:scene3d>
+    <dgm:sp3d/>
+    <dgm:txPr/>
+    <dgm:style>
+      <a:lnRef idx="2">
+        <a:scrgbClr r="0" g="0" b="0"/>
+      </a:lnRef>
+      <a:fillRef idx="1">
+        <a:scrgbClr r="0" g="0" b="0"/>
+      </a:fillRef>
+      <a:effectRef idx="0">
+        <a:scrgbClr r="0" g="0" b="0"/>
+      </a:effectRef>
+      <a:fontRef idx="minor"/>
+    </dgm:style>
+  </dgm:styleLbl>
+  <dgm:styleLbl name="fgAcc2">
+    <dgm:scene3d>
+      <a:camera prst="orthographicFront"/>
+      <a:lightRig rig="threePt" dir="t"/>
+    </dgm:scene3d>
+    <dgm:sp3d/>
+    <dgm:txPr/>
+    <dgm:style>
+      <a:lnRef idx="2">
+        <a:scrgbClr r="0" g="0" b="0"/>
+      </a:lnRef>
+      <a:fillRef idx="1">
+        <a:scrgbClr r="0" g="0" b="0"/>
+      </a:fillRef>
+      <a:effectRef idx="0">
+        <a:scrgbClr r="0" g="0" b="0"/>
+      </a:effectRef>
+      <a:fontRef idx="minor"/>
+    </dgm:style>
+  </dgm:styleLbl>
+  <dgm:styleLbl name="fgAcc3">
+    <dgm:scene3d>
+      <a:camera prst="orthographicFront"/>
+      <a:lightRig rig="threePt" dir="t"/>
+    </dgm:scene3d>
+    <dgm:sp3d/>
+    <dgm:txPr/>
+    <dgm:style>
+      <a:lnRef idx="2">
+        <a:scrgbClr r="0" g="0" b="0"/>
+      </a:lnRef>
+      <a:fillRef idx="1">
+        <a:scrgbClr r="0" g="0" b="0"/>
+      </a:fillRef>
+      <a:effectRef idx="0">
+        <a:scrgbClr r="0" g="0" b="0"/>
+      </a:effectRef>
+      <a:fontRef idx="minor"/>
+    </dgm:style>
+  </dgm:styleLbl>
+  <dgm:styleLbl name="fgAcc4">
+    <dgm:scene3d>
+      <a:camera prst="orthographicFront"/>
+      <a:lightRig rig="threePt" dir="t"/>
+    </dgm:scene3d>
+    <dgm:sp3d/>
+    <dgm:txPr/>
+    <dgm:style>
+      <a:lnRef idx="2">
+        <a:scrgbClr r="0" g="0" b="0"/>
+      </a:lnRef>
+      <a:fillRef idx="1">
+        <a:scrgbClr r="0" g="0" b="0"/>
+      </a:fillRef>
+      <a:effectRef idx="0">
+        <a:scrgbClr r="0" g="0" b="0"/>
+      </a:effectRef>
+      <a:fontRef idx="minor"/>
+    </dgm:style>
+  </dgm:styleLbl>
+  <dgm:styleLbl name="bgShp">
+    <dgm:scene3d>
+      <a:camera prst="orthographicFront"/>
+      <a:lightRig rig="threePt" dir="t"/>
+    </dgm:scene3d>
+    <dgm:sp3d/>
+    <dgm:txPr/>
+    <dgm:style>
+      <a:lnRef idx="0">
+        <a:scrgbClr r="0" g="0" b="0"/>
+      </a:lnRef>
+      <a:fillRef idx="1">
+        <a:scrgbClr r="0" g="0" b="0"/>
+      </a:fillRef>
+      <a:effectRef idx="0">
+        <a:scrgbClr r="0" g="0" b="0"/>
+      </a:effectRef>
+      <a:fontRef idx="minor"/>
+    </dgm:style>
+  </dgm:styleLbl>
+  <dgm:styleLbl name="dkBgShp">
+    <dgm:scene3d>
+      <a:camera prst="orthographicFront"/>
+      <a:lightRig rig="threePt" dir="t"/>
+    </dgm:scene3d>
+    <dgm:sp3d/>
+    <dgm:txPr/>
+    <dgm:style>
+      <a:lnRef idx="0">
+        <a:scrgbClr r="0" g="0" b="0"/>
+      </a:lnRef>
+      <a:fillRef idx="1">
+        <a:scrgbClr r="0" g="0" b="0"/>
+      </a:fillRef>
+      <a:effectRef idx="0">
+        <a:scrgbClr r="0" g="0" b="0"/>
+      </a:effectRef>
+      <a:fontRef idx="minor"/>
+    </dgm:style>
+  </dgm:styleLbl>
+  <dgm:styleLbl name="trBgShp">
+    <dgm:scene3d>
+      <a:camera prst="orthographicFront"/>
+      <a:lightRig rig="threePt" dir="t"/>
+    </dgm:scene3d>
+    <dgm:sp3d/>
+    <dgm:txPr/>
+    <dgm:style>
+      <a:lnRef idx="0">
+        <a:scrgbClr r="0" g="0" b="0"/>
+      </a:lnRef>
+      <a:fillRef idx="1">
+        <a:scrgbClr r="0" g="0" b="0"/>
+      </a:fillRef>
+      <a:effectRef idx="0">
+        <a:scrgbClr r="0" g="0" b="0"/>
+      </a:effectRef>
+      <a:fontRef idx="minor"/>
+    </dgm:style>
+  </dgm:styleLbl>
+  <dgm:styleLbl name="fgShp">
+    <dgm:scene3d>
+      <a:camera prst="orthographicFront"/>
+      <a:lightRig rig="threePt" dir="t"/>
+    </dgm:scene3d>
+    <dgm:sp3d/>
+    <dgm:txPr/>
+    <dgm:style>
+      <a:lnRef idx="2">
+        <a:scrgbClr r="0" g="0" b="0"/>
+      </a:lnRef>
+      <a:fillRef idx="1">
+        <a:scrgbClr r="0" g="0" b="0"/>
+      </a:fillRef>
+      <a:effectRef idx="0">
+        <a:scrgbClr r="0" g="0" b="0"/>
+      </a:effectRef>
+      <a:fontRef idx="minor"/>
+    </dgm:style>
+  </dgm:styleLbl>
+  <dgm:styleLbl name="revTx">
+    <dgm:scene3d>
+      <a:camera prst="orthographicFront"/>
+      <a:lightRig rig="threePt" dir="t"/>
+    </dgm:scene3d>
+    <dgm:sp3d/>
+    <dgm:txPr/>
+    <dgm:style>
+      <a:lnRef idx="0">
+        <a:scrgbClr r="0" g="0" b="0"/>
+      </a:lnRef>
+      <a:fillRef idx="0">
+        <a:scrgbClr r="0" g="0" b="0"/>
+      </a:fillRef>
+      <a:effectRef idx="0">
+        <a:scrgbClr r="0" g="0" b="0"/>
+      </a:effectRef>
+      <a:fontRef idx="minor"/>
+    </dgm:style>
+  </dgm:styleLbl>
+</dgm:styleDef>
 </file>
 
 <file path=ppt/notesMasters/notesMaster1.xml><?xml version="1.0" encoding="utf-8"?>
@@ -207,7 +3200,7 @@
           <a:p>
             <a:fld id="{8A60DA54-2C8D-C144-8D5B-ED93BCC08EBC}" type="datetimeFigureOut">
               <a:rPr lang="en-US" smtClean="0"/>
-              <a:t>11/22/21</a:t>
+              <a:t>11/23/2021</a:t>
             </a:fld>
             <a:endParaRPr lang="en-US"/>
           </a:p>
@@ -691,7 +3684,7 @@
           <a:p>
             <a:fld id="{A17302DF-282E-5045-AD93-B10E092C4D76}" type="datetime1">
               <a:rPr lang="en-US" smtClean="0"/>
-              <a:t>11/22/21</a:t>
+              <a:t>11/23/2021</a:t>
             </a:fld>
             <a:endParaRPr lang="en-US"/>
           </a:p>
@@ -1029,7 +4022,7 @@
           <a:p>
             <a:fld id="{7051C248-0A93-744B-AB02-B074890E4BFB}" type="datetime1">
               <a:rPr lang="en-US" smtClean="0"/>
-              <a:t>11/22/21</a:t>
+              <a:t>11/23/2021</a:t>
             </a:fld>
             <a:endParaRPr lang="en-US"/>
           </a:p>
@@ -1335,7 +4328,7 @@
           <a:p>
             <a:fld id="{E2FB5ED4-1094-CE40-AD73-CF683A397F32}" type="datetime1">
               <a:rPr lang="en-US" smtClean="0"/>
-              <a:t>11/22/21</a:t>
+              <a:t>11/23/2021</a:t>
             </a:fld>
             <a:endParaRPr lang="en-US"/>
           </a:p>
@@ -1586,7 +4579,7 @@
           <a:p>
             <a:fld id="{5398144C-4A17-1F44-951C-D6094082A43A}" type="datetime1">
               <a:rPr lang="en-US" smtClean="0"/>
-              <a:t>11/22/21</a:t>
+              <a:t>11/23/2021</a:t>
             </a:fld>
             <a:endParaRPr lang="en-US"/>
           </a:p>
@@ -1997,7 +4990,7 @@
           <a:p>
             <a:fld id="{F4C8F34B-496D-5147-A057-59EA683414BA}" type="datetime1">
               <a:rPr lang="en-US" smtClean="0"/>
-              <a:t>11/22/21</a:t>
+              <a:t>11/23/2021</a:t>
             </a:fld>
             <a:endParaRPr lang="en-US"/>
           </a:p>
@@ -2315,7 +5308,7 @@
           <a:p>
             <a:fld id="{EDFF9562-1223-4943-9CFA-F4038B153653}" type="datetime1">
               <a:rPr lang="en-US" smtClean="0"/>
-              <a:t>11/22/21</a:t>
+              <a:t>11/23/2021</a:t>
             </a:fld>
             <a:endParaRPr lang="en-US"/>
           </a:p>
@@ -2863,7 +5856,7 @@
           <a:p>
             <a:fld id="{D8CBC8A2-C59F-7C48-A0C8-65530B9B58B6}" type="datetime1">
               <a:rPr lang="en-US" smtClean="0"/>
-              <a:t>11/22/21</a:t>
+              <a:t>11/23/2021</a:t>
             </a:fld>
             <a:endParaRPr lang="en-US"/>
           </a:p>
@@ -3063,7 +6056,7 @@
           <a:p>
             <a:fld id="{1737AD88-783F-E74A-AC36-8B971CA881DB}" type="datetime1">
               <a:rPr lang="en-US" smtClean="0"/>
-              <a:t>11/22/21</a:t>
+              <a:t>11/23/2021</a:t>
             </a:fld>
             <a:endParaRPr lang="en-US"/>
           </a:p>
@@ -3280,7 +6273,7 @@
           <a:p>
             <a:fld id="{DAA93DDA-E668-6743-ABF3-9FC32416B710}" type="datetime1">
               <a:rPr lang="en-US" smtClean="0"/>
-              <a:t>11/22/21</a:t>
+              <a:t>11/23/2021</a:t>
             </a:fld>
             <a:endParaRPr lang="en-US"/>
           </a:p>
@@ -3653,7 +6646,7 @@
           <a:p>
             <a:fld id="{3E4E7CAE-0913-5743-844D-E24670A417DC}" type="datetime1">
               <a:rPr lang="en-US" smtClean="0"/>
-              <a:t>11/22/21</a:t>
+              <a:t>11/23/2021</a:t>
             </a:fld>
             <a:endParaRPr lang="en-US"/>
           </a:p>
@@ -4060,7 +7053,7 @@
           <a:p>
             <a:fld id="{BBF3B8AB-BA7E-9C4E-AF0A-FBED6B4CBAD4}" type="datetime1">
               <a:rPr lang="en-US" smtClean="0"/>
-              <a:t>11/22/21</a:t>
+              <a:t>11/23/2021</a:t>
             </a:fld>
             <a:endParaRPr lang="en-US"/>
           </a:p>
@@ -4375,7 +7368,7 @@
           <a:p>
             <a:fld id="{D8CBC8A2-C59F-7C48-A0C8-65530B9B58B6}" type="datetime1">
               <a:rPr lang="en-US" smtClean="0"/>
-              <a:t>11/22/21</a:t>
+              <a:t>11/23/2021</a:t>
             </a:fld>
             <a:endParaRPr lang="en-US"/>
           </a:p>
@@ -5725,32 +8718,10 @@
           <a:bodyPr/>
           <a:lstStyle/>
           <a:p>
-            <a:endParaRPr lang="en-US"/>
-          </a:p>
-        </p:txBody>
-      </p:sp>
-      <p:sp>
-        <p:nvSpPr>
-          <p:cNvPr id="3" name="Content Placeholder 2">
-            <a:extLst>
-              <a:ext uri="{FF2B5EF4-FFF2-40B4-BE49-F238E27FC236}">
-                <a16:creationId xmlns:a16="http://schemas.microsoft.com/office/drawing/2014/main" id="{9E359C67-F364-9142-A371-1EFC1202FB6A}"/>
-              </a:ext>
-            </a:extLst>
-          </p:cNvPr>
-          <p:cNvSpPr>
-            <a:spLocks noGrp="1"/>
-          </p:cNvSpPr>
-          <p:nvPr>
-            <p:ph idx="1"/>
-          </p:nvPr>
-        </p:nvSpPr>
-        <p:spPr/>
-        <p:txBody>
-          <a:bodyPr/>
-          <a:lstStyle/>
-          <a:p>
-            <a:endParaRPr lang="en-US"/>
+            <a:r>
+              <a:rPr lang="en-US" dirty="0"/>
+              <a:t>Modeling Process</a:t>
+            </a:r>
           </a:p>
         </p:txBody>
       </p:sp>
@@ -5811,6 +8782,34 @@
           </a:p>
         </p:txBody>
       </p:sp>
+      <p:graphicFrame>
+        <p:nvGraphicFramePr>
+          <p:cNvPr id="7" name="Diagram 6">
+            <a:extLst>
+              <a:ext uri="{FF2B5EF4-FFF2-40B4-BE49-F238E27FC236}">
+                <a16:creationId xmlns:a16="http://schemas.microsoft.com/office/drawing/2014/main" id="{66145B23-E6C8-4D86-906C-7512F4C75C1E}"/>
+              </a:ext>
+            </a:extLst>
+          </p:cNvPr>
+          <p:cNvGraphicFramePr/>
+          <p:nvPr>
+            <p:extLst>
+              <p:ext uri="{D42A27DB-BD31-4B8C-83A1-F6EECF244321}">
+                <p14:modId xmlns:p14="http://schemas.microsoft.com/office/powerpoint/2010/main" val="2580781124"/>
+              </p:ext>
+            </p:extLst>
+          </p:nvPr>
+        </p:nvGraphicFramePr>
+        <p:xfrm>
+          <a:off x="1493241" y="1367406"/>
+          <a:ext cx="8808440" cy="4770927"/>
+        </p:xfrm>
+        <a:graphic>
+          <a:graphicData uri="http://schemas.openxmlformats.org/drawingml/2006/diagram">
+            <dgm:relIds xmlns:dgm="http://schemas.openxmlformats.org/drawingml/2006/diagram" xmlns:r="http://schemas.openxmlformats.org/officeDocument/2006/relationships" r:dm="rId2" r:lo="rId3" r:qs="rId4" r:cs="rId5"/>
+          </a:graphicData>
+        </a:graphic>
+      </p:graphicFrame>
     </p:spTree>
     <p:extLst>
       <p:ext uri="{BB962C8B-B14F-4D97-AF65-F5344CB8AC3E}">

</xml_diff>